<commit_message>
Added scripts for New User Seminar
</commit_message>
<xml_diff>
--- a/RC_Access_Specific_Topics/How_Use_Supercomputer_Summit/how_use_supercomputer_summit.pptx
+++ b/RC_Access_Specific_Topics/How_Use_Supercomputer_Summit/how_use_supercomputer_summit.pptx
@@ -5,10 +5,10 @@
     <p:sldMasterId id="2147483841" r:id="rId1"/>
   </p:sldMasterIdLst>
   <p:notesMasterIdLst>
-    <p:notesMasterId r:id="rId36"/>
+    <p:notesMasterId r:id="rId37"/>
   </p:notesMasterIdLst>
   <p:handoutMasterIdLst>
-    <p:handoutMasterId r:id="rId37"/>
+    <p:handoutMasterId r:id="rId38"/>
   </p:handoutMasterIdLst>
   <p:sldIdLst>
     <p:sldId id="257" r:id="rId2"/>
@@ -21,30 +21,31 @@
     <p:sldId id="270" r:id="rId9"/>
     <p:sldId id="318" r:id="rId10"/>
     <p:sldId id="303" r:id="rId11"/>
-    <p:sldId id="304" r:id="rId12"/>
-    <p:sldId id="263" r:id="rId13"/>
-    <p:sldId id="278" r:id="rId14"/>
-    <p:sldId id="319" r:id="rId15"/>
-    <p:sldId id="289" r:id="rId16"/>
-    <p:sldId id="286" r:id="rId17"/>
-    <p:sldId id="292" r:id="rId18"/>
-    <p:sldId id="331" r:id="rId19"/>
-    <p:sldId id="332" r:id="rId20"/>
-    <p:sldId id="333" r:id="rId21"/>
-    <p:sldId id="334" r:id="rId22"/>
-    <p:sldId id="322" r:id="rId23"/>
-    <p:sldId id="324" r:id="rId24"/>
-    <p:sldId id="325" r:id="rId25"/>
-    <p:sldId id="326" r:id="rId26"/>
-    <p:sldId id="327" r:id="rId27"/>
-    <p:sldId id="328" r:id="rId28"/>
-    <p:sldId id="329" r:id="rId29"/>
-    <p:sldId id="312" r:id="rId30"/>
-    <p:sldId id="306" r:id="rId31"/>
-    <p:sldId id="330" r:id="rId32"/>
-    <p:sldId id="308" r:id="rId33"/>
-    <p:sldId id="320" r:id="rId34"/>
-    <p:sldId id="321" r:id="rId35"/>
+    <p:sldId id="335" r:id="rId12"/>
+    <p:sldId id="304" r:id="rId13"/>
+    <p:sldId id="263" r:id="rId14"/>
+    <p:sldId id="278" r:id="rId15"/>
+    <p:sldId id="319" r:id="rId16"/>
+    <p:sldId id="289" r:id="rId17"/>
+    <p:sldId id="286" r:id="rId18"/>
+    <p:sldId id="292" r:id="rId19"/>
+    <p:sldId id="331" r:id="rId20"/>
+    <p:sldId id="332" r:id="rId21"/>
+    <p:sldId id="333" r:id="rId22"/>
+    <p:sldId id="334" r:id="rId23"/>
+    <p:sldId id="322" r:id="rId24"/>
+    <p:sldId id="324" r:id="rId25"/>
+    <p:sldId id="325" r:id="rId26"/>
+    <p:sldId id="326" r:id="rId27"/>
+    <p:sldId id="327" r:id="rId28"/>
+    <p:sldId id="328" r:id="rId29"/>
+    <p:sldId id="329" r:id="rId30"/>
+    <p:sldId id="312" r:id="rId31"/>
+    <p:sldId id="306" r:id="rId32"/>
+    <p:sldId id="330" r:id="rId33"/>
+    <p:sldId id="308" r:id="rId34"/>
+    <p:sldId id="320" r:id="rId35"/>
+    <p:sldId id="321" r:id="rId36"/>
   </p:sldIdLst>
   <p:sldSz cx="9144000" cy="6858000" type="screen4x3"/>
   <p:notesSz cx="6858000" cy="9144000"/>
@@ -158,6 +159,9 @@
         </p15:guide>
       </p15:sldGuideLst>
     </p:ext>
+    <p:ext uri="{2D200454-40CA-4A62-9FC3-DE9A4176ACB9}">
+      <p15:notesGuideLst xmlns:p15="http://schemas.microsoft.com/office/powerpoint/2012/main"/>
+    </p:ext>
   </p:extLst>
 </p:presentation>
 </file>
@@ -244,7 +248,7 @@
           <a:p>
             <a:fld id="{595B738E-61D3-FF43-9AAF-3D2023FB1DC3}" type="datetimeFigureOut">
               <a:rPr lang="en-US" smtClean="0"/>
-              <a:t>1/19/17</a:t>
+              <a:t>3/17/17</a:t>
             </a:fld>
             <a:endParaRPr lang="en-US"/>
           </a:p>
@@ -410,7 +414,7 @@
           <a:p>
             <a:fld id="{7BBD8333-6779-F842-8F4E-BFED34008A7A}" type="datetimeFigureOut">
               <a:rPr lang="en-US" smtClean="0"/>
-              <a:t>1/19/17</a:t>
+              <a:t>3/17/17</a:t>
             </a:fld>
             <a:endParaRPr lang="en-US"/>
           </a:p>
@@ -828,7 +832,7 @@
           <a:p>
             <a:fld id="{08008AE1-FA72-B840-8C8E-D06497C18101}" type="slidenum">
               <a:rPr lang="en-US" smtClean="0"/>
-              <a:t>12</a:t>
+              <a:t>13</a:t>
             </a:fld>
             <a:endParaRPr lang="en-US"/>
           </a:p>
@@ -920,7 +924,7 @@
           <a:p>
             <a:fld id="{08008AE1-FA72-B840-8C8E-D06497C18101}" type="slidenum">
               <a:rPr lang="en-US" smtClean="0"/>
-              <a:t>13</a:t>
+              <a:t>14</a:t>
             </a:fld>
             <a:endParaRPr lang="en-US"/>
           </a:p>
@@ -1004,7 +1008,7 @@
           <a:p>
             <a:fld id="{08008AE1-FA72-B840-8C8E-D06497C18101}" type="slidenum">
               <a:rPr lang="en-US" smtClean="0"/>
-              <a:t>15</a:t>
+              <a:t>16</a:t>
             </a:fld>
             <a:endParaRPr lang="en-US"/>
           </a:p>
@@ -1088,7 +1092,7 @@
           <a:p>
             <a:fld id="{08008AE1-FA72-B840-8C8E-D06497C18101}" type="slidenum">
               <a:rPr lang="en-US" smtClean="0"/>
-              <a:t>17</a:t>
+              <a:t>18</a:t>
             </a:fld>
             <a:endParaRPr lang="en-US"/>
           </a:p>
@@ -1172,7 +1176,7 @@
           <a:p>
             <a:fld id="{08008AE1-FA72-B840-8C8E-D06497C18101}" type="slidenum">
               <a:rPr lang="en-US" smtClean="0"/>
-              <a:t>18</a:t>
+              <a:t>19</a:t>
             </a:fld>
             <a:endParaRPr lang="en-US"/>
           </a:p>
@@ -1256,7 +1260,7 @@
           <a:p>
             <a:fld id="{08008AE1-FA72-B840-8C8E-D06497C18101}" type="slidenum">
               <a:rPr lang="en-US" smtClean="0"/>
-              <a:t>19</a:t>
+              <a:t>20</a:t>
             </a:fld>
             <a:endParaRPr lang="en-US"/>
           </a:p>
@@ -1340,7 +1344,7 @@
           <a:p>
             <a:fld id="{08008AE1-FA72-B840-8C8E-D06497C18101}" type="slidenum">
               <a:rPr lang="en-US" smtClean="0"/>
-              <a:t>20</a:t>
+              <a:t>21</a:t>
             </a:fld>
             <a:endParaRPr lang="en-US"/>
           </a:p>
@@ -1424,7 +1428,7 @@
           <a:p>
             <a:fld id="{08008AE1-FA72-B840-8C8E-D06497C18101}" type="slidenum">
               <a:rPr lang="en-US" smtClean="0"/>
-              <a:t>21</a:t>
+              <a:t>22</a:t>
             </a:fld>
             <a:endParaRPr lang="en-US"/>
           </a:p>
@@ -1508,7 +1512,7 @@
           <a:p>
             <a:fld id="{08008AE1-FA72-B840-8C8E-D06497C18101}" type="slidenum">
               <a:rPr lang="en-US" smtClean="0"/>
-              <a:t>30</a:t>
+              <a:t>31</a:t>
             </a:fld>
             <a:endParaRPr lang="en-US"/>
           </a:p>
@@ -1592,7 +1596,7 @@
           <a:p>
             <a:fld id="{08008AE1-FA72-B840-8C8E-D06497C18101}" type="slidenum">
               <a:rPr lang="en-US" smtClean="0"/>
-              <a:t>31</a:t>
+              <a:t>32</a:t>
             </a:fld>
             <a:endParaRPr lang="en-US"/>
           </a:p>
@@ -1760,7 +1764,7 @@
           <a:p>
             <a:fld id="{08008AE1-FA72-B840-8C8E-D06497C18101}" type="slidenum">
               <a:rPr lang="en-US" smtClean="0"/>
-              <a:t>32</a:t>
+              <a:t>33</a:t>
             </a:fld>
             <a:endParaRPr lang="en-US"/>
           </a:p>
@@ -2256,14 +2260,14 @@
               <ma14:placeholderFlag xmlns:ma14="http://schemas.microsoft.com/office/mac/drawingml/2011/main" val="1"/>
             </a:ext>
             <a:ext uri="{909E8E84-426E-40dd-AFC4-6F175D3DCCD1}">
-              <a14:hiddenFill xmlns="" xmlns:a14="http://schemas.microsoft.com/office/drawing/2010/main">
+              <a14:hiddenFill xmlns:a14="http://schemas.microsoft.com/office/drawing/2010/main" xmlns="">
                 <a:solidFill>
                   <a:srgbClr val="FFFFFF"/>
                 </a:solidFill>
               </a14:hiddenFill>
             </a:ext>
             <a:ext uri="{91240B29-F687-4f45-9708-019B960494DF}">
-              <a14:hiddenLine xmlns="" xmlns:a14="http://schemas.microsoft.com/office/drawing/2010/main" w="9525">
+              <a14:hiddenLine xmlns:a14="http://schemas.microsoft.com/office/drawing/2010/main" xmlns="" w="9525">
                 <a:solidFill>
                   <a:srgbClr val="000000"/>
                 </a:solidFill>
@@ -2301,14 +2305,14 @@
           <a:ln/>
           <a:extLst>
             <a:ext uri="{909E8E84-426E-40dd-AFC4-6F175D3DCCD1}">
-              <a14:hiddenFill xmlns="" xmlns:a14="http://schemas.microsoft.com/office/drawing/2010/main">
+              <a14:hiddenFill xmlns:a14="http://schemas.microsoft.com/office/drawing/2010/main" xmlns="">
                 <a:solidFill>
                   <a:srgbClr val="FFFFFF"/>
                 </a:solidFill>
               </a14:hiddenFill>
             </a:ext>
             <a:ext uri="{91240B29-F687-4f45-9708-019B960494DF}">
-              <a14:hiddenLine xmlns="" xmlns:a14="http://schemas.microsoft.com/office/drawing/2010/main" w="9525">
+              <a14:hiddenLine xmlns:a14="http://schemas.microsoft.com/office/drawing/2010/main" xmlns="" w="9525">
                 <a:solidFill>
                   <a:srgbClr val="000000"/>
                 </a:solidFill>
@@ -2536,7 +2540,7 @@
           <a:p>
             <a:fld id="{08008AE1-FA72-B840-8C8E-D06497C18101}" type="slidenum">
               <a:rPr lang="en-US" smtClean="0"/>
-              <a:t>11</a:t>
+              <a:t>12</a:t>
             </a:fld>
             <a:endParaRPr lang="en-US"/>
           </a:p>
@@ -2749,7 +2753,7 @@
           <a:p>
             <a:fld id="{D4F5601E-F2CF-F84B-8D1C-8CE929678837}" type="datetime1">
               <a:rPr lang="en-US" smtClean="0"/>
-              <a:t>1/19/17</a:t>
+              <a:t>3/17/17</a:t>
             </a:fld>
             <a:endParaRPr lang="en-US" dirty="0"/>
           </a:p>
@@ -2951,7 +2955,7 @@
           <a:p>
             <a:fld id="{EF0CA858-4E4A-1E41-B7CC-25112B7BAD8B}" type="datetime1">
               <a:rPr lang="en-US" smtClean="0"/>
-              <a:t>1/19/17</a:t>
+              <a:t>3/17/17</a:t>
             </a:fld>
             <a:endParaRPr lang="en-US" dirty="0"/>
           </a:p>
@@ -3250,7 +3254,7 @@
           <a:p>
             <a:fld id="{E44A2F9B-0FB8-8649-AF58-85065CCE31D7}" type="datetime1">
               <a:rPr lang="en-US" smtClean="0"/>
-              <a:t>1/19/17</a:t>
+              <a:t>3/17/17</a:t>
             </a:fld>
             <a:endParaRPr lang="en-US" dirty="0"/>
           </a:p>
@@ -3609,7 +3613,7 @@
           <a:p>
             <a:fld id="{DC13F8D8-D0AE-9D48-B4AF-815DBDF9B2D2}" type="datetime1">
               <a:rPr lang="en-US" smtClean="0"/>
-              <a:t>1/19/17</a:t>
+              <a:t>3/17/17</a:t>
             </a:fld>
             <a:endParaRPr lang="en-US" dirty="0"/>
           </a:p>
@@ -4085,7 +4089,7 @@
           <a:p>
             <a:fld id="{8B845F84-57ED-634E-95B9-B664C3AB770A}" type="datetime1">
               <a:rPr lang="en-US" smtClean="0"/>
-              <a:t>1/19/17</a:t>
+              <a:t>3/17/17</a:t>
             </a:fld>
             <a:endParaRPr lang="en-US" dirty="0"/>
           </a:p>
@@ -4438,8 +4442,22 @@
             </a:pPr>
             <a:r>
               <a:rPr lang="en-US" sz="2800" dirty="0" smtClean="0"/>
-              <a:t>GPFS File system</a:t>
-            </a:r>
+              <a:t>GPFS File </a:t>
+            </a:r>
+            <a:r>
+              <a:rPr lang="en-US" sz="2800" dirty="0" smtClean="0"/>
+              <a:t>system</a:t>
+            </a:r>
+          </a:p>
+          <a:p>
+            <a:pPr>
+              <a:defRPr/>
+            </a:pPr>
+            <a:r>
+              <a:rPr lang="en-US" sz="2800" smtClean="0"/>
+              <a:t>Replaced Janus</a:t>
+            </a:r>
+            <a:endParaRPr lang="en-US" sz="2800" dirty="0" smtClean="0"/>
           </a:p>
         </p:txBody>
       </p:sp>
@@ -4460,7 +4478,7 @@
           <a:p>
             <a:fld id="{7FEF204D-DD8A-F643-B9D2-08EC19F164F1}" type="datetime1">
               <a:rPr lang="en-US" smtClean="0"/>
-              <a:t>1/19/17</a:t>
+              <a:t>3/17/17</a:t>
             </a:fld>
             <a:endParaRPr lang="en-US" dirty="0"/>
           </a:p>
@@ -4589,10 +4607,6 @@
           <a:bodyPr/>
           <a:lstStyle/>
           <a:p>
-            <a:r>
-              <a:rPr lang="en-US" smtClean="0"/>
-              <a:t>Additional Compute Resources</a:t>
-            </a:r>
             <a:endParaRPr lang="en-US" dirty="0"/>
           </a:p>
         </p:txBody>
@@ -4609,76 +4623,16 @@
         </p:nvSpPr>
         <p:spPr/>
         <p:txBody>
-          <a:bodyPr>
-            <a:noAutofit/>
-          </a:bodyPr>
-          <a:lstStyle/>
-          <a:p>
-            <a:r>
-              <a:rPr lang="en-US" sz="2800" dirty="0" smtClean="0"/>
-              <a:t>10 Graphics Processing Unit (GPU) Nodes</a:t>
-            </a:r>
-          </a:p>
-          <a:p>
-            <a:pPr lvl="1"/>
-            <a:r>
-              <a:rPr lang="en-US" sz="2800" dirty="0" smtClean="0"/>
-              <a:t>Visualization of data</a:t>
-            </a:r>
-          </a:p>
-          <a:p>
-            <a:pPr lvl="1"/>
-            <a:r>
-              <a:rPr lang="en-US" sz="2800" dirty="0" smtClean="0"/>
-              <a:t>NVIDIA Tesla K80 (2/node)</a:t>
-            </a:r>
-          </a:p>
-          <a:p>
-            <a:r>
-              <a:rPr lang="en-US" sz="2800" dirty="0"/>
-              <a:t>5</a:t>
-            </a:r>
-            <a:r>
-              <a:rPr lang="en-US" sz="2800" dirty="0" smtClean="0"/>
-              <a:t> High Memory Nodes</a:t>
-            </a:r>
-          </a:p>
-          <a:p>
-            <a:pPr lvl="1"/>
-            <a:r>
-              <a:rPr lang="en-US" sz="2800" dirty="0"/>
-              <a:t>2</a:t>
-            </a:r>
-            <a:r>
-              <a:rPr lang="en-US" sz="2800" dirty="0" smtClean="0"/>
-              <a:t> TB of memory/node, 48 cores/node</a:t>
-            </a:r>
-          </a:p>
-          <a:p>
-            <a:r>
-              <a:rPr lang="en-US" sz="2800" dirty="0" smtClean="0"/>
-              <a:t>Phi Nodes (planned summer 2017)</a:t>
-            </a:r>
-          </a:p>
-          <a:p>
-            <a:pPr lvl="1"/>
-            <a:r>
-              <a:rPr lang="en-US" sz="2600" dirty="0" smtClean="0"/>
-              <a:t>20 nodes</a:t>
-            </a:r>
-          </a:p>
-          <a:p>
-            <a:pPr lvl="1"/>
-            <a:r>
-              <a:rPr lang="en-US" sz="2600" dirty="0" smtClean="0"/>
-              <a:t>Intel Xeon Phi</a:t>
-            </a:r>
-          </a:p>
-        </p:txBody>
-      </p:sp>
-      <p:sp>
-        <p:nvSpPr>
-          <p:cNvPr id="5" name="Date Placeholder 4"/>
+          <a:bodyPr/>
+          <a:lstStyle/>
+          <a:p>
+            <a:endParaRPr lang="en-US"/>
+          </a:p>
+        </p:txBody>
+      </p:sp>
+      <p:sp>
+        <p:nvSpPr>
+          <p:cNvPr id="4" name="Date Placeholder 3"/>
           <p:cNvSpPr>
             <a:spLocks noGrp="1"/>
           </p:cNvSpPr>
@@ -4691,17 +4645,17 @@
           <a:bodyPr/>
           <a:lstStyle/>
           <a:p>
-            <a:fld id="{CF50E3D3-8D3C-834E-815B-56BE34E1152C}" type="datetime1">
-              <a:rPr lang="en-US" smtClean="0"/>
-              <a:t>1/19/17</a:t>
+            <a:fld id="{EF0CA858-4E4A-1E41-B7CC-25112B7BAD8B}" type="datetime1">
+              <a:rPr lang="en-US" smtClean="0"/>
+              <a:t>3/20/17</a:t>
             </a:fld>
-            <a:endParaRPr lang="en-US"/>
-          </a:p>
-        </p:txBody>
-      </p:sp>
-      <p:sp>
-        <p:nvSpPr>
-          <p:cNvPr id="6" name="Footer Placeholder 5"/>
+            <a:endParaRPr lang="en-US" dirty="0"/>
+          </a:p>
+        </p:txBody>
+      </p:sp>
+      <p:sp>
+        <p:nvSpPr>
+          <p:cNvPr id="5" name="Footer Placeholder 4"/>
           <p:cNvSpPr>
             <a:spLocks noGrp="1"/>
           </p:cNvSpPr>
@@ -4718,13 +4672,13 @@
               <a:rPr lang="en-US" smtClean="0"/>
               <a:t>Basics of Supercomputing</a:t>
             </a:r>
-            <a:endParaRPr lang="en-US"/>
-          </a:p>
-        </p:txBody>
-      </p:sp>
-      <p:sp>
-        <p:nvSpPr>
-          <p:cNvPr id="21" name="Slide Number Placeholder 20"/>
+            <a:endParaRPr lang="en-US" dirty="0"/>
+          </a:p>
+        </p:txBody>
+      </p:sp>
+      <p:sp>
+        <p:nvSpPr>
+          <p:cNvPr id="6" name="Slide Number Placeholder 5"/>
           <p:cNvSpPr>
             <a:spLocks noGrp="1"/>
           </p:cNvSpPr>
@@ -4749,20 +4703,13 @@
     </p:spTree>
     <p:extLst>
       <p:ext uri="{BB962C8B-B14F-4D97-AF65-F5344CB8AC3E}">
-        <p14:creationId xmlns:p14="http://schemas.microsoft.com/office/powerpoint/2010/main" val="579026251"/>
+        <p14:creationId xmlns:p14="http://schemas.microsoft.com/office/powerpoint/2010/main" val="382836297"/>
       </p:ext>
     </p:extLst>
   </p:cSld>
   <p:clrMapOvr>
     <a:masterClrMapping/>
   </p:clrMapOvr>
-  <p:timing>
-    <p:tnLst>
-      <p:par>
-        <p:cTn id="1" dur="indefinite" restart="never" nodeType="tmRoot"/>
-      </p:par>
-    </p:tnLst>
-  </p:timing>
 </p:sld>
 </file>
 
@@ -4800,7 +4747,7 @@
           <a:p>
             <a:r>
               <a:rPr lang="en-US" smtClean="0"/>
-              <a:t>Different Node Types</a:t>
+              <a:t>Additional Compute Resources</a:t>
             </a:r>
             <a:endParaRPr lang="en-US" dirty="0"/>
           </a:p>
@@ -4818,66 +4765,69 @@
         </p:nvSpPr>
         <p:spPr/>
         <p:txBody>
-          <a:bodyPr/>
-          <a:lstStyle/>
-          <a:p>
-            <a:r>
-              <a:rPr lang="en-US" dirty="0" smtClean="0"/>
-              <a:t>Login nodes</a:t>
+          <a:bodyPr>
+            <a:noAutofit/>
+          </a:bodyPr>
+          <a:lstStyle/>
+          <a:p>
+            <a:r>
+              <a:rPr lang="en-US" sz="2800" dirty="0" smtClean="0"/>
+              <a:t>10 Graphics Processing Unit (GPU) Nodes</a:t>
             </a:r>
           </a:p>
           <a:p>
             <a:pPr lvl="1"/>
             <a:r>
-              <a:rPr lang="en-US" dirty="0" smtClean="0"/>
-              <a:t>This is where you are when you log in</a:t>
+              <a:rPr lang="en-US" sz="2800" dirty="0" smtClean="0"/>
+              <a:t>Visualization of data</a:t>
             </a:r>
           </a:p>
           <a:p>
             <a:pPr lvl="1"/>
             <a:r>
-              <a:rPr lang="en-US" dirty="0" smtClean="0"/>
-              <a:t>No heavy computation, interactive jobs, or long running processes</a:t>
+              <a:rPr lang="en-US" sz="2800" dirty="0" smtClean="0"/>
+              <a:t>NVIDIA Tesla K80 (2/node)</a:t>
+            </a:r>
+          </a:p>
+          <a:p>
+            <a:r>
+              <a:rPr lang="en-US" sz="2800" dirty="0"/>
+              <a:t>5</a:t>
+            </a:r>
+            <a:r>
+              <a:rPr lang="en-US" sz="2800" dirty="0" smtClean="0"/>
+              <a:t> High Memory Nodes</a:t>
             </a:r>
           </a:p>
           <a:p>
             <a:pPr lvl="1"/>
             <a:r>
-              <a:rPr lang="en-US" dirty="0" smtClean="0"/>
-              <a:t>Script or code editing, minor compiling</a:t>
+              <a:rPr lang="en-US" sz="2800" dirty="0"/>
+              <a:t>2</a:t>
+            </a:r>
+            <a:r>
+              <a:rPr lang="en-US" sz="2800" dirty="0" smtClean="0"/>
+              <a:t> TB of memory/node, 48 cores/node</a:t>
+            </a:r>
+          </a:p>
+          <a:p>
+            <a:r>
+              <a:rPr lang="en-US" sz="2800" dirty="0" smtClean="0"/>
+              <a:t>Phi Nodes (planned summer 2017)</a:t>
             </a:r>
           </a:p>
           <a:p>
             <a:pPr lvl="1"/>
             <a:r>
-              <a:rPr lang="en-US" dirty="0" smtClean="0"/>
-              <a:t>Job submission</a:t>
-            </a:r>
-          </a:p>
-          <a:p>
-            <a:r>
-              <a:rPr lang="en-US" dirty="0" smtClean="0"/>
-              <a:t>Compile nodes</a:t>
-            </a:r>
-          </a:p>
-          <a:p>
-            <a:r>
-              <a:rPr lang="en-US" dirty="0" smtClean="0"/>
-              <a:t>Compute/batch nodes</a:t>
+              <a:rPr lang="en-US" sz="2600" dirty="0" smtClean="0"/>
+              <a:t>20 nodes</a:t>
             </a:r>
           </a:p>
           <a:p>
             <a:pPr lvl="1"/>
             <a:r>
-              <a:rPr lang="en-US" dirty="0" smtClean="0"/>
-              <a:t>This is where jobs that are submitted through the scheduler run</a:t>
-            </a:r>
-          </a:p>
-          <a:p>
-            <a:pPr lvl="1"/>
-            <a:r>
-              <a:rPr lang="en-US" dirty="0" smtClean="0"/>
-              <a:t>Intended for heavy computation</a:t>
+              <a:rPr lang="en-US" sz="2600" dirty="0" smtClean="0"/>
+              <a:t>Intel Xeon Phi</a:t>
             </a:r>
           </a:p>
         </p:txBody>
@@ -4897,11 +4847,11 @@
           <a:bodyPr/>
           <a:lstStyle/>
           <a:p>
-            <a:fld id="{38960852-5513-E046-BD5A-67CB45FAD2DF}" type="datetime1">
-              <a:rPr lang="en-US" smtClean="0"/>
-              <a:t>1/19/17</a:t>
+            <a:fld id="{CF50E3D3-8D3C-834E-815B-56BE34E1152C}" type="datetime1">
+              <a:rPr lang="en-US" smtClean="0"/>
+              <a:t>3/17/17</a:t>
             </a:fld>
-            <a:endParaRPr lang="en-US" dirty="0"/>
+            <a:endParaRPr lang="en-US"/>
           </a:p>
         </p:txBody>
       </p:sp>
@@ -4955,7 +4905,7 @@
     </p:spTree>
     <p:extLst>
       <p:ext uri="{BB962C8B-B14F-4D97-AF65-F5344CB8AC3E}">
-        <p14:creationId xmlns:p14="http://schemas.microsoft.com/office/powerpoint/2010/main" val="3009264784"/>
+        <p14:creationId xmlns:p14="http://schemas.microsoft.com/office/powerpoint/2010/main" val="579026251"/>
       </p:ext>
     </p:extLst>
   </p:cSld>
@@ -4991,6 +4941,212 @@
       </p:grpSpPr>
       <p:sp>
         <p:nvSpPr>
+          <p:cNvPr id="2" name="Title 1"/>
+          <p:cNvSpPr>
+            <a:spLocks noGrp="1"/>
+          </p:cNvSpPr>
+          <p:nvPr>
+            <p:ph type="title"/>
+          </p:nvPr>
+        </p:nvSpPr>
+        <p:spPr/>
+        <p:txBody>
+          <a:bodyPr/>
+          <a:lstStyle/>
+          <a:p>
+            <a:r>
+              <a:rPr lang="en-US" smtClean="0"/>
+              <a:t>Different Node Types</a:t>
+            </a:r>
+            <a:endParaRPr lang="en-US" dirty="0"/>
+          </a:p>
+        </p:txBody>
+      </p:sp>
+      <p:sp>
+        <p:nvSpPr>
+          <p:cNvPr id="3" name="Content Placeholder 2"/>
+          <p:cNvSpPr>
+            <a:spLocks noGrp="1"/>
+          </p:cNvSpPr>
+          <p:nvPr>
+            <p:ph idx="1"/>
+          </p:nvPr>
+        </p:nvSpPr>
+        <p:spPr/>
+        <p:txBody>
+          <a:bodyPr/>
+          <a:lstStyle/>
+          <a:p>
+            <a:r>
+              <a:rPr lang="en-US" dirty="0" smtClean="0"/>
+              <a:t>Login nodes</a:t>
+            </a:r>
+          </a:p>
+          <a:p>
+            <a:pPr lvl="1"/>
+            <a:r>
+              <a:rPr lang="en-US" dirty="0" smtClean="0"/>
+              <a:t>This is where you are when you log in</a:t>
+            </a:r>
+          </a:p>
+          <a:p>
+            <a:pPr lvl="1"/>
+            <a:r>
+              <a:rPr lang="en-US" dirty="0" smtClean="0"/>
+              <a:t>No heavy computation, interactive jobs, or long running processes</a:t>
+            </a:r>
+          </a:p>
+          <a:p>
+            <a:pPr lvl="1"/>
+            <a:r>
+              <a:rPr lang="en-US" dirty="0" smtClean="0"/>
+              <a:t>Script or code editing, minor compiling</a:t>
+            </a:r>
+          </a:p>
+          <a:p>
+            <a:pPr lvl="1"/>
+            <a:r>
+              <a:rPr lang="en-US" dirty="0" smtClean="0"/>
+              <a:t>Job submission</a:t>
+            </a:r>
+          </a:p>
+          <a:p>
+            <a:r>
+              <a:rPr lang="en-US" dirty="0" smtClean="0"/>
+              <a:t>Compile nodes</a:t>
+            </a:r>
+          </a:p>
+          <a:p>
+            <a:r>
+              <a:rPr lang="en-US" dirty="0" smtClean="0"/>
+              <a:t>Compute/batch nodes</a:t>
+            </a:r>
+          </a:p>
+          <a:p>
+            <a:pPr lvl="1"/>
+            <a:r>
+              <a:rPr lang="en-US" dirty="0" smtClean="0"/>
+              <a:t>This is where jobs that are submitted through the scheduler run</a:t>
+            </a:r>
+          </a:p>
+          <a:p>
+            <a:pPr lvl="1"/>
+            <a:r>
+              <a:rPr lang="en-US" dirty="0" smtClean="0"/>
+              <a:t>Intended for heavy computation</a:t>
+            </a:r>
+          </a:p>
+        </p:txBody>
+      </p:sp>
+      <p:sp>
+        <p:nvSpPr>
+          <p:cNvPr id="5" name="Date Placeholder 4"/>
+          <p:cNvSpPr>
+            <a:spLocks noGrp="1"/>
+          </p:cNvSpPr>
+          <p:nvPr>
+            <p:ph type="dt" sz="half" idx="10"/>
+          </p:nvPr>
+        </p:nvSpPr>
+        <p:spPr/>
+        <p:txBody>
+          <a:bodyPr/>
+          <a:lstStyle/>
+          <a:p>
+            <a:fld id="{38960852-5513-E046-BD5A-67CB45FAD2DF}" type="datetime1">
+              <a:rPr lang="en-US" smtClean="0"/>
+              <a:t>3/17/17</a:t>
+            </a:fld>
+            <a:endParaRPr lang="en-US" dirty="0"/>
+          </a:p>
+        </p:txBody>
+      </p:sp>
+      <p:sp>
+        <p:nvSpPr>
+          <p:cNvPr id="6" name="Footer Placeholder 5"/>
+          <p:cNvSpPr>
+            <a:spLocks noGrp="1"/>
+          </p:cNvSpPr>
+          <p:nvPr>
+            <p:ph type="ftr" sz="quarter" idx="11"/>
+          </p:nvPr>
+        </p:nvSpPr>
+        <p:spPr/>
+        <p:txBody>
+          <a:bodyPr/>
+          <a:lstStyle/>
+          <a:p>
+            <a:r>
+              <a:rPr lang="en-US" smtClean="0"/>
+              <a:t>Basics of Supercomputing</a:t>
+            </a:r>
+            <a:endParaRPr lang="en-US"/>
+          </a:p>
+        </p:txBody>
+      </p:sp>
+      <p:sp>
+        <p:nvSpPr>
+          <p:cNvPr id="21" name="Slide Number Placeholder 20"/>
+          <p:cNvSpPr>
+            <a:spLocks noGrp="1"/>
+          </p:cNvSpPr>
+          <p:nvPr>
+            <p:ph type="sldNum" sz="quarter" idx="4"/>
+          </p:nvPr>
+        </p:nvSpPr>
+        <p:spPr/>
+        <p:txBody>
+          <a:bodyPr/>
+          <a:lstStyle/>
+          <a:p>
+            <a:fld id="{249E94F7-107C-CE46-8C56-9CACFF99CD93}" type="slidenum">
+              <a:rPr lang="en-US" smtClean="0"/>
+              <a:pPr/>
+              <a:t>13</a:t>
+            </a:fld>
+            <a:endParaRPr lang="en-US" dirty="0"/>
+          </a:p>
+        </p:txBody>
+      </p:sp>
+    </p:spTree>
+    <p:extLst>
+      <p:ext uri="{BB962C8B-B14F-4D97-AF65-F5344CB8AC3E}">
+        <p14:creationId xmlns:p14="http://schemas.microsoft.com/office/powerpoint/2010/main" val="3009264784"/>
+      </p:ext>
+    </p:extLst>
+  </p:cSld>
+  <p:clrMapOvr>
+    <a:masterClrMapping/>
+  </p:clrMapOvr>
+  <p:timing>
+    <p:tnLst>
+      <p:par>
+        <p:cTn id="1" dur="indefinite" restart="never" nodeType="tmRoot"/>
+      </p:par>
+    </p:tnLst>
+  </p:timing>
+</p:sld>
+</file>
+
+<file path=ppt/slides/slide14.xml><?xml version="1.0" encoding="utf-8"?>
+<p:sld xmlns:a="http://schemas.openxmlformats.org/drawingml/2006/main" xmlns:r="http://schemas.openxmlformats.org/officeDocument/2006/relationships" xmlns:p="http://schemas.openxmlformats.org/presentationml/2006/main">
+  <p:cSld>
+    <p:spTree>
+      <p:nvGrpSpPr>
+        <p:cNvPr id="1" name=""/>
+        <p:cNvGrpSpPr/>
+        <p:nvPr/>
+      </p:nvGrpSpPr>
+      <p:grpSpPr>
+        <a:xfrm>
+          <a:off x="0" y="0"/>
+          <a:ext cx="0" cy="0"/>
+          <a:chOff x="0" y="0"/>
+          <a:chExt cx="0" cy="0"/>
+        </a:xfrm>
+      </p:grpSpPr>
+      <p:sp>
+        <p:nvSpPr>
           <p:cNvPr id="6" name="Title 5"/>
           <p:cNvSpPr>
             <a:spLocks noGrp="1"/>
@@ -5132,7 +5288,7 @@
           <a:p>
             <a:fld id="{D6D17D7A-3E10-2746-841A-497F22B6C679}" type="datetime1">
               <a:rPr lang="en-US" smtClean="0"/>
-              <a:t>1/19/17</a:t>
+              <a:t>3/17/17</a:t>
             </a:fld>
             <a:endParaRPr lang="en-US"/>
           </a:p>
@@ -5408,7 +5564,7 @@
             <a:fld id="{249E94F7-107C-CE46-8C56-9CACFF99CD93}" type="slidenum">
               <a:rPr lang="en-US" smtClean="0"/>
               <a:pPr/>
-              <a:t>13</a:t>
+              <a:t>14</a:t>
             </a:fld>
             <a:endParaRPr lang="en-US" dirty="0"/>
           </a:p>
@@ -5434,135 +5590,6 @@
 </p:sld>
 </file>
 
-<file path=ppt/slides/slide14.xml><?xml version="1.0" encoding="utf-8"?>
-<p:sld xmlns:a="http://schemas.openxmlformats.org/drawingml/2006/main" xmlns:r="http://schemas.openxmlformats.org/officeDocument/2006/relationships" xmlns:p="http://schemas.openxmlformats.org/presentationml/2006/main">
-  <p:cSld>
-    <p:spTree>
-      <p:nvGrpSpPr>
-        <p:cNvPr id="1" name=""/>
-        <p:cNvGrpSpPr/>
-        <p:nvPr/>
-      </p:nvGrpSpPr>
-      <p:grpSpPr>
-        <a:xfrm>
-          <a:off x="0" y="0"/>
-          <a:ext cx="0" cy="0"/>
-          <a:chOff x="0" y="0"/>
-          <a:chExt cx="0" cy="0"/>
-        </a:xfrm>
-      </p:grpSpPr>
-      <p:sp>
-        <p:nvSpPr>
-          <p:cNvPr id="2" name="Title 1"/>
-          <p:cNvSpPr>
-            <a:spLocks noGrp="1"/>
-          </p:cNvSpPr>
-          <p:nvPr>
-            <p:ph type="title"/>
-          </p:nvPr>
-        </p:nvSpPr>
-        <p:spPr>
-          <a:xfrm>
-            <a:off x="457200" y="2798898"/>
-            <a:ext cx="8191532" cy="1143000"/>
-          </a:xfrm>
-        </p:spPr>
-        <p:txBody>
-          <a:bodyPr/>
-          <a:lstStyle/>
-          <a:p>
-            <a:pPr algn="ctr"/>
-            <a:r>
-              <a:rPr lang="en-US" dirty="0" smtClean="0"/>
-              <a:t>Jobs</a:t>
-            </a:r>
-            <a:endParaRPr lang="en-US" dirty="0"/>
-          </a:p>
-        </p:txBody>
-      </p:sp>
-      <p:sp>
-        <p:nvSpPr>
-          <p:cNvPr id="4" name="Date Placeholder 3"/>
-          <p:cNvSpPr>
-            <a:spLocks noGrp="1"/>
-          </p:cNvSpPr>
-          <p:nvPr>
-            <p:ph type="dt" sz="half" idx="10"/>
-          </p:nvPr>
-        </p:nvSpPr>
-        <p:spPr/>
-        <p:txBody>
-          <a:bodyPr/>
-          <a:lstStyle/>
-          <a:p>
-            <a:fld id="{EF0CA858-4E4A-1E41-B7CC-25112B7BAD8B}" type="datetime1">
-              <a:rPr lang="en-US" smtClean="0"/>
-              <a:t>1/19/17</a:t>
-            </a:fld>
-            <a:endParaRPr lang="en-US" dirty="0"/>
-          </a:p>
-        </p:txBody>
-      </p:sp>
-      <p:sp>
-        <p:nvSpPr>
-          <p:cNvPr id="5" name="Footer Placeholder 4"/>
-          <p:cNvSpPr>
-            <a:spLocks noGrp="1"/>
-          </p:cNvSpPr>
-          <p:nvPr>
-            <p:ph type="ftr" sz="quarter" idx="11"/>
-          </p:nvPr>
-        </p:nvSpPr>
-        <p:spPr/>
-        <p:txBody>
-          <a:bodyPr/>
-          <a:lstStyle/>
-          <a:p>
-            <a:r>
-              <a:rPr lang="en-US" smtClean="0"/>
-              <a:t>Basics of Supercomputing</a:t>
-            </a:r>
-            <a:endParaRPr lang="en-US" dirty="0"/>
-          </a:p>
-        </p:txBody>
-      </p:sp>
-      <p:sp>
-        <p:nvSpPr>
-          <p:cNvPr id="6" name="Slide Number Placeholder 5"/>
-          <p:cNvSpPr>
-            <a:spLocks noGrp="1"/>
-          </p:cNvSpPr>
-          <p:nvPr>
-            <p:ph type="sldNum" sz="quarter" idx="4"/>
-          </p:nvPr>
-        </p:nvSpPr>
-        <p:spPr/>
-        <p:txBody>
-          <a:bodyPr/>
-          <a:lstStyle/>
-          <a:p>
-            <a:fld id="{249E94F7-107C-CE46-8C56-9CACFF99CD93}" type="slidenum">
-              <a:rPr lang="en-US" smtClean="0"/>
-              <a:pPr/>
-              <a:t>14</a:t>
-            </a:fld>
-            <a:endParaRPr lang="en-US" dirty="0"/>
-          </a:p>
-        </p:txBody>
-      </p:sp>
-    </p:spTree>
-    <p:extLst>
-      <p:ext uri="{BB962C8B-B14F-4D97-AF65-F5344CB8AC3E}">
-        <p14:creationId xmlns:p14="http://schemas.microsoft.com/office/powerpoint/2010/main" val="803961000"/>
-      </p:ext>
-    </p:extLst>
-  </p:cSld>
-  <p:clrMapOvr>
-    <a:masterClrMapping/>
-  </p:clrMapOvr>
-</p:sld>
-</file>
-
 <file path=ppt/slides/slide15.xml><?xml version="1.0" encoding="utf-8"?>
 <p:sld xmlns:a="http://schemas.openxmlformats.org/drawingml/2006/main" xmlns:r="http://schemas.openxmlformats.org/officeDocument/2006/relationships" xmlns:p="http://schemas.openxmlformats.org/presentationml/2006/main">
   <p:cSld>
@@ -5590,14 +5617,20 @@
             <p:ph type="title"/>
           </p:nvPr>
         </p:nvSpPr>
-        <p:spPr/>
-        <p:txBody>
-          <a:bodyPr/>
-          <a:lstStyle/>
-          <a:p>
-            <a:r>
-              <a:rPr lang="en-US" smtClean="0"/>
-              <a:t>Running Jobs</a:t>
+        <p:spPr>
+          <a:xfrm>
+            <a:off x="457200" y="2798898"/>
+            <a:ext cx="8191532" cy="1143000"/>
+          </a:xfrm>
+        </p:spPr>
+        <p:txBody>
+          <a:bodyPr/>
+          <a:lstStyle/>
+          <a:p>
+            <a:pPr algn="ctr"/>
+            <a:r>
+              <a:rPr lang="en-US" dirty="0" smtClean="0"/>
+              <a:t>Jobs</a:t>
             </a:r>
             <a:endParaRPr lang="en-US" dirty="0"/>
           </a:p>
@@ -5605,81 +5638,7 @@
       </p:sp>
       <p:sp>
         <p:nvSpPr>
-          <p:cNvPr id="3" name="Content Placeholder 2"/>
-          <p:cNvSpPr>
-            <a:spLocks noGrp="1"/>
-          </p:cNvSpPr>
-          <p:nvPr>
-            <p:ph idx="1"/>
-          </p:nvPr>
-        </p:nvSpPr>
-        <p:spPr/>
-        <p:txBody>
-          <a:bodyPr>
-            <a:normAutofit/>
-          </a:bodyPr>
-          <a:lstStyle/>
-          <a:p>
-            <a:r>
-              <a:rPr lang="en-US" dirty="0" smtClean="0"/>
-              <a:t>What is a “job”?</a:t>
-            </a:r>
-          </a:p>
-          <a:p>
-            <a:endParaRPr lang="en-US" dirty="0" smtClean="0"/>
-          </a:p>
-          <a:p>
-            <a:r>
-              <a:rPr lang="en-US" dirty="0" smtClean="0"/>
-              <a:t>Interactive jobs</a:t>
-            </a:r>
-          </a:p>
-          <a:p>
-            <a:pPr lvl="1"/>
-            <a:r>
-              <a:rPr lang="en-US" dirty="0" smtClean="0"/>
-              <a:t>Work interactively at the command line of a compute node</a:t>
-            </a:r>
-          </a:p>
-          <a:p>
-            <a:pPr lvl="1"/>
-            <a:endParaRPr lang="en-US" dirty="0" smtClean="0"/>
-          </a:p>
-          <a:p>
-            <a:r>
-              <a:rPr lang="en-US" dirty="0" smtClean="0"/>
-              <a:t>Batch jobs</a:t>
-            </a:r>
-          </a:p>
-          <a:p>
-            <a:pPr lvl="1"/>
-            <a:r>
-              <a:rPr lang="en-US" dirty="0" smtClean="0"/>
-              <a:t>Submit job that will be executed when resources are available</a:t>
-            </a:r>
-          </a:p>
-          <a:p>
-            <a:pPr lvl="1"/>
-            <a:r>
-              <a:rPr lang="en-US" dirty="0" smtClean="0"/>
-              <a:t>Create a text file containing information about the job</a:t>
-            </a:r>
-          </a:p>
-          <a:p>
-            <a:pPr lvl="1"/>
-            <a:r>
-              <a:rPr lang="en-US" dirty="0" smtClean="0"/>
-              <a:t>Submit the job file to a queue</a:t>
-            </a:r>
-          </a:p>
-          <a:p>
-            <a:endParaRPr lang="en-US" dirty="0" smtClean="0"/>
-          </a:p>
-        </p:txBody>
-      </p:sp>
-      <p:sp>
-        <p:nvSpPr>
-          <p:cNvPr id="5" name="Date Placeholder 4"/>
+          <p:cNvPr id="4" name="Date Placeholder 3"/>
           <p:cNvSpPr>
             <a:spLocks noGrp="1"/>
           </p:cNvSpPr>
@@ -5692,17 +5651,17 @@
           <a:bodyPr/>
           <a:lstStyle/>
           <a:p>
-            <a:fld id="{379F30A9-C42A-574F-A77B-1838B43B69F0}" type="datetime1">
-              <a:rPr lang="en-US" smtClean="0"/>
-              <a:t>1/19/17</a:t>
+            <a:fld id="{EF0CA858-4E4A-1E41-B7CC-25112B7BAD8B}" type="datetime1">
+              <a:rPr lang="en-US" smtClean="0"/>
+              <a:t>3/17/17</a:t>
             </a:fld>
-            <a:endParaRPr lang="en-US"/>
-          </a:p>
-        </p:txBody>
-      </p:sp>
-      <p:sp>
-        <p:nvSpPr>
-          <p:cNvPr id="4" name="Footer Placeholder 3"/>
+            <a:endParaRPr lang="en-US" dirty="0"/>
+          </a:p>
+        </p:txBody>
+      </p:sp>
+      <p:sp>
+        <p:nvSpPr>
+          <p:cNvPr id="5" name="Footer Placeholder 4"/>
           <p:cNvSpPr>
             <a:spLocks noGrp="1"/>
           </p:cNvSpPr>
@@ -5725,7 +5684,7 @@
       </p:sp>
       <p:sp>
         <p:nvSpPr>
-          <p:cNvPr id="21" name="Slide Number Placeholder 20"/>
+          <p:cNvPr id="6" name="Slide Number Placeholder 5"/>
           <p:cNvSpPr>
             <a:spLocks noGrp="1"/>
           </p:cNvSpPr>
@@ -5750,20 +5709,13 @@
     </p:spTree>
     <p:extLst>
       <p:ext uri="{BB962C8B-B14F-4D97-AF65-F5344CB8AC3E}">
-        <p14:creationId xmlns:p14="http://schemas.microsoft.com/office/powerpoint/2010/main" val="1992772936"/>
+        <p14:creationId xmlns:p14="http://schemas.microsoft.com/office/powerpoint/2010/main" val="803961000"/>
       </p:ext>
     </p:extLst>
   </p:cSld>
   <p:clrMapOvr>
     <a:masterClrMapping/>
   </p:clrMapOvr>
-  <p:timing>
-    <p:tnLst>
-      <p:par>
-        <p:cTn id="1" dur="indefinite" restart="never" nodeType="tmRoot"/>
-      </p:par>
-    </p:tnLst>
-  </p:timing>
 </p:sld>
 </file>
 
@@ -5801,7 +5753,7 @@
           <a:p>
             <a:r>
               <a:rPr lang="en-US" smtClean="0"/>
-              <a:t>Job Scheduling</a:t>
+              <a:t>Running Jobs</a:t>
             </a:r>
             <a:endParaRPr lang="en-US" dirty="0"/>
           </a:p>
@@ -5826,78 +5778,64 @@
           <a:p>
             <a:r>
               <a:rPr lang="en-US" dirty="0" smtClean="0"/>
-              <a:t>On a supercomputer, jobs are scheduled rather than just run instantly at the command line</a:t>
+              <a:t>What is a “job”?</a:t>
+            </a:r>
+          </a:p>
+          <a:p>
+            <a:endParaRPr lang="en-US" dirty="0" smtClean="0"/>
+          </a:p>
+          <a:p>
+            <a:r>
+              <a:rPr lang="en-US" dirty="0" smtClean="0"/>
+              <a:t>Interactive jobs</a:t>
             </a:r>
           </a:p>
           <a:p>
             <a:pPr lvl="1"/>
             <a:r>
-              <a:rPr lang="en-US" dirty="0"/>
-              <a:t>Shared </a:t>
-            </a:r>
-            <a:r>
               <a:rPr lang="en-US" dirty="0" smtClean="0"/>
-              <a:t>system</a:t>
-            </a:r>
-          </a:p>
-          <a:p>
-            <a:pPr lvl="1"/>
-            <a:r>
-              <a:rPr lang="en-US" dirty="0" smtClean="0"/>
-              <a:t>People are allocated a certain amount of time on the system</a:t>
-            </a:r>
-          </a:p>
-          <a:p>
-            <a:pPr lvl="1"/>
-            <a:r>
-              <a:rPr lang="en-US" dirty="0" smtClean="0"/>
-              <a:t>Based on your need</a:t>
-            </a:r>
-          </a:p>
-          <a:p>
-            <a:pPr lvl="2"/>
-            <a:r>
-              <a:rPr lang="en-US" dirty="0" smtClean="0"/>
-              <a:t>Proposal</a:t>
-            </a:r>
-          </a:p>
-          <a:p>
-            <a:pPr lvl="2"/>
-            <a:r>
-              <a:rPr lang="en-US" dirty="0" smtClean="0"/>
-              <a:t>Request the amount of resources needed and for how long</a:t>
-            </a:r>
-          </a:p>
-          <a:p>
-            <a:pPr lvl="1"/>
-            <a:r>
-              <a:rPr lang="en-US" dirty="0" smtClean="0"/>
-              <a:t>Jobs are put in a queue until resources are available</a:t>
-            </a:r>
-          </a:p>
-          <a:p>
-            <a:r>
-              <a:rPr lang="en-US" dirty="0"/>
-              <a:t>Need software that will distribute the jobs </a:t>
-            </a:r>
-            <a:r>
-              <a:rPr lang="en-US" dirty="0" smtClean="0"/>
-              <a:t>appropriately and </a:t>
-            </a:r>
-            <a:r>
-              <a:rPr lang="en-US" dirty="0"/>
-              <a:t>manage the resources</a:t>
+              <a:t>Work interactively at the command line of a compute node</a:t>
             </a:r>
           </a:p>
           <a:p>
             <a:pPr lvl="1"/>
             <a:endParaRPr lang="en-US" dirty="0" smtClean="0"/>
           </a:p>
-        </p:txBody>
-      </p:sp>
-      <p:sp>
-        <p:nvSpPr>
-          <p:cNvPr id="4" name="Date Placeholder 3"/>
+          <a:p>
+            <a:r>
+              <a:rPr lang="en-US" dirty="0" smtClean="0"/>
+              <a:t>Batch jobs</a:t>
+            </a:r>
+          </a:p>
+          <a:p>
+            <a:pPr lvl="1"/>
+            <a:r>
+              <a:rPr lang="en-US" dirty="0" smtClean="0"/>
+              <a:t>Submit job that will be executed when resources are available</a:t>
+            </a:r>
+          </a:p>
+          <a:p>
+            <a:pPr lvl="1"/>
+            <a:r>
+              <a:rPr lang="en-US" dirty="0" smtClean="0"/>
+              <a:t>Create a text file containing information about the job</a:t>
+            </a:r>
+          </a:p>
+          <a:p>
+            <a:pPr lvl="1"/>
+            <a:r>
+              <a:rPr lang="en-US" dirty="0" smtClean="0"/>
+              <a:t>Submit the job file to a queue</a:t>
+            </a:r>
+          </a:p>
+          <a:p>
+            <a:endParaRPr lang="en-US" dirty="0" smtClean="0"/>
+          </a:p>
+        </p:txBody>
+      </p:sp>
+      <p:sp>
+        <p:nvSpPr>
+          <p:cNvPr id="5" name="Date Placeholder 4"/>
           <p:cNvSpPr>
             <a:spLocks noGrp="1"/>
           </p:cNvSpPr>
@@ -5910,17 +5848,17 @@
           <a:bodyPr/>
           <a:lstStyle/>
           <a:p>
-            <a:fld id="{061CABE0-14DE-BC4B-91D1-2209001212ED}" type="datetime1">
-              <a:rPr lang="en-US" smtClean="0"/>
-              <a:t>1/19/17</a:t>
+            <a:fld id="{379F30A9-C42A-574F-A77B-1838B43B69F0}" type="datetime1">
+              <a:rPr lang="en-US" smtClean="0"/>
+              <a:t>3/17/17</a:t>
             </a:fld>
-            <a:endParaRPr lang="en-US" dirty="0"/>
-          </a:p>
-        </p:txBody>
-      </p:sp>
-      <p:sp>
-        <p:nvSpPr>
-          <p:cNvPr id="6" name="Footer Placeholder 5"/>
+            <a:endParaRPr lang="en-US"/>
+          </a:p>
+        </p:txBody>
+      </p:sp>
+      <p:sp>
+        <p:nvSpPr>
+          <p:cNvPr id="4" name="Footer Placeholder 3"/>
           <p:cNvSpPr>
             <a:spLocks noGrp="1"/>
           </p:cNvSpPr>
@@ -5968,7 +5906,7 @@
     </p:spTree>
     <p:extLst>
       <p:ext uri="{BB962C8B-B14F-4D97-AF65-F5344CB8AC3E}">
-        <p14:creationId xmlns:p14="http://schemas.microsoft.com/office/powerpoint/2010/main" val="2907783526"/>
+        <p14:creationId xmlns:p14="http://schemas.microsoft.com/office/powerpoint/2010/main" val="1992772936"/>
       </p:ext>
     </p:extLst>
   </p:cSld>
@@ -6019,7 +5957,7 @@
           <a:p>
             <a:r>
               <a:rPr lang="en-US" smtClean="0"/>
-              <a:t>Job Schedulers - Slurm</a:t>
+              <a:t>Job Scheduling</a:t>
             </a:r>
             <a:endParaRPr lang="en-US" dirty="0"/>
           </a:p>
@@ -6044,91 +5982,78 @@
           <a:p>
             <a:r>
               <a:rPr lang="en-US" dirty="0" smtClean="0"/>
-              <a:t>Jobs on supercomputers are managed and run by different software</a:t>
-            </a:r>
-          </a:p>
-          <a:p>
+              <a:t>On a supercomputer, jobs are scheduled rather than just run instantly at the command line</a:t>
+            </a:r>
+          </a:p>
+          <a:p>
+            <a:pPr lvl="1"/>
+            <a:r>
+              <a:rPr lang="en-US" dirty="0"/>
+              <a:t>Shared </a:t>
+            </a:r>
             <a:r>
               <a:rPr lang="en-US" dirty="0" smtClean="0"/>
-              <a:t>Simple Linux Utility for Resource Management (</a:t>
-            </a:r>
-            <a:r>
-              <a:rPr lang="en-US" dirty="0" err="1" smtClean="0"/>
-              <a:t>Slurm</a:t>
-            </a:r>
+              <a:t>system</a:t>
+            </a:r>
+          </a:p>
+          <a:p>
+            <a:pPr lvl="1"/>
             <a:r>
               <a:rPr lang="en-US" dirty="0" smtClean="0"/>
-              <a:t>)</a:t>
+              <a:t>People are allocated a certain amount of time on the system</a:t>
             </a:r>
           </a:p>
           <a:p>
             <a:pPr lvl="1"/>
             <a:r>
               <a:rPr lang="en-US" dirty="0" smtClean="0"/>
-              <a:t>Open source software package</a:t>
-            </a:r>
-          </a:p>
-          <a:p>
-            <a:r>
-              <a:rPr lang="en-US" dirty="0" err="1" smtClean="0"/>
-              <a:t>Slurm</a:t>
-            </a:r>
+              <a:t>Based on your need</a:t>
+            </a:r>
+          </a:p>
+          <a:p>
+            <a:pPr lvl="2"/>
             <a:r>
               <a:rPr lang="en-US" dirty="0" smtClean="0"/>
-              <a:t> is a resource manager</a:t>
+              <a:t>Proposal</a:t>
+            </a:r>
+          </a:p>
+          <a:p>
+            <a:pPr lvl="2"/>
+            <a:r>
+              <a:rPr lang="en-US" dirty="0" smtClean="0"/>
+              <a:t>Request the amount of resources needed and for how long</a:t>
             </a:r>
           </a:p>
           <a:p>
             <a:pPr lvl="1"/>
             <a:r>
               <a:rPr lang="en-US" dirty="0" smtClean="0"/>
-              <a:t>Keeps track of what nodes are busy/available, and what jobs are queued or running</a:t>
-            </a:r>
-          </a:p>
-          <a:p>
-            <a:r>
-              <a:rPr lang="en-US" dirty="0" err="1" smtClean="0"/>
-              <a:t>Slurm</a:t>
+              <a:t>Jobs are put in a queue until resources are available</a:t>
+            </a:r>
+          </a:p>
+          <a:p>
+            <a:r>
+              <a:rPr lang="en-US" dirty="0"/>
+              <a:t>Need software that will distribute the jobs </a:t>
             </a:r>
             <a:r>
               <a:rPr lang="en-US" dirty="0" smtClean="0"/>
-              <a:t> is a scheduler</a:t>
-            </a:r>
-          </a:p>
-          <a:p>
-            <a:pPr lvl="1"/>
-            <a:r>
-              <a:rPr lang="en-US" dirty="0" smtClean="0"/>
-              <a:t>Tells the resource manager when to run which job on the available resources</a:t>
-            </a:r>
-          </a:p>
-          <a:p>
+              <a:t>appropriately and </a:t>
+            </a:r>
             <a:r>
               <a:rPr lang="en-US" dirty="0"/>
-              <a:t>No longer need to load the </a:t>
-            </a:r>
-            <a:r>
-              <a:rPr lang="en-US" dirty="0" err="1"/>
-              <a:t>Slurm</a:t>
-            </a:r>
-            <a:r>
-              <a:rPr lang="en-US" dirty="0"/>
-              <a:t> module!</a:t>
+              <a:t>manage the resources</a:t>
             </a:r>
           </a:p>
           <a:p>
             <a:pPr lvl="1"/>
             <a:endParaRPr lang="en-US" dirty="0" smtClean="0"/>
           </a:p>
-          <a:p>
-            <a:pPr lvl="2"/>
-            <a:endParaRPr lang="en-US" dirty="0" smtClean="0"/>
-          </a:p>
-        </p:txBody>
-      </p:sp>
-      <p:sp>
-        <p:nvSpPr>
-          <p:cNvPr id="5" name="Date Placeholder 4"/>
+        </p:txBody>
+      </p:sp>
+      <p:sp>
+        <p:nvSpPr>
+          <p:cNvPr id="4" name="Date Placeholder 3"/>
           <p:cNvSpPr>
             <a:spLocks noGrp="1"/>
           </p:cNvSpPr>
@@ -6141,11 +6066,11 @@
           <a:bodyPr/>
           <a:lstStyle/>
           <a:p>
-            <a:fld id="{BED45C82-5CED-1D4D-8A60-2BF62DF704F8}" type="datetime1">
-              <a:rPr lang="en-US" smtClean="0"/>
-              <a:t>1/19/17</a:t>
+            <a:fld id="{061CABE0-14DE-BC4B-91D1-2209001212ED}" type="datetime1">
+              <a:rPr lang="en-US" smtClean="0"/>
+              <a:t>3/17/17</a:t>
             </a:fld>
-            <a:endParaRPr lang="en-US"/>
+            <a:endParaRPr lang="en-US" dirty="0"/>
           </a:p>
         </p:txBody>
       </p:sp>
@@ -6199,7 +6124,7 @@
     </p:spTree>
     <p:extLst>
       <p:ext uri="{BB962C8B-B14F-4D97-AF65-F5344CB8AC3E}">
-        <p14:creationId xmlns:p14="http://schemas.microsoft.com/office/powerpoint/2010/main" val="823288718"/>
+        <p14:creationId xmlns:p14="http://schemas.microsoft.com/office/powerpoint/2010/main" val="2907783526"/>
       </p:ext>
     </p:extLst>
   </p:cSld>
@@ -6249,8 +6174,8 @@
           <a:lstStyle/>
           <a:p>
             <a:r>
-              <a:rPr lang="en-US" dirty="0" smtClean="0"/>
-              <a:t>Partitions and ‘Quality of Services’</a:t>
+              <a:rPr lang="en-US" smtClean="0"/>
+              <a:t>Job Schedulers - Slurm</a:t>
             </a:r>
             <a:endParaRPr lang="en-US" dirty="0"/>
           </a:p>
@@ -6275,80 +6200,85 @@
           <a:p>
             <a:r>
               <a:rPr lang="en-US" dirty="0" smtClean="0"/>
-              <a:t>There are several ways to define where your job will run</a:t>
+              <a:t>Jobs on supercomputers are managed and run by different software</a:t>
             </a:r>
           </a:p>
           <a:p>
             <a:r>
               <a:rPr lang="en-US" dirty="0" smtClean="0"/>
-              <a:t>Partitions (basically a queue):</a:t>
+              <a:t>Simple Linux Utility for Resource Management (</a:t>
+            </a:r>
+            <a:r>
+              <a:rPr lang="en-US" dirty="0" err="1" smtClean="0"/>
+              <a:t>Slurm</a:t>
+            </a:r>
+            <a:r>
+              <a:rPr lang="en-US" dirty="0" smtClean="0"/>
+              <a:t>)</a:t>
             </a:r>
           </a:p>
           <a:p>
             <a:pPr lvl="1"/>
             <a:r>
               <a:rPr lang="en-US" dirty="0" smtClean="0"/>
-              <a:t>Resources/hardware</a:t>
+              <a:t>Open source software package</a:t>
             </a:r>
           </a:p>
           <a:p>
             <a:r>
               <a:rPr lang="en-US" dirty="0" err="1" smtClean="0"/>
-              <a:t>QoS</a:t>
-            </a:r>
-            <a:r>
-              <a:rPr lang="en-US" dirty="0" smtClean="0">
-                <a:sym typeface="Wingdings"/>
-              </a:rPr>
-              <a:t>:</a:t>
-            </a:r>
+              <a:t>Slurm</a:t>
+            </a:r>
+            <a:r>
+              <a:rPr lang="en-US" dirty="0" smtClean="0"/>
+              <a:t> is a resource manager</a:t>
+            </a:r>
+          </a:p>
+          <a:p>
+            <a:pPr lvl="1"/>
+            <a:r>
+              <a:rPr lang="en-US" dirty="0" smtClean="0"/>
+              <a:t>Keeps track of what nodes are busy/available, and what jobs are queued or running</a:t>
+            </a:r>
+          </a:p>
+          <a:p>
+            <a:r>
+              <a:rPr lang="en-US" dirty="0" err="1" smtClean="0"/>
+              <a:t>Slurm</a:t>
+            </a:r>
+            <a:r>
+              <a:rPr lang="en-US" dirty="0" smtClean="0"/>
+              <a:t> is a scheduler</a:t>
+            </a:r>
+          </a:p>
+          <a:p>
+            <a:pPr lvl="1"/>
+            <a:r>
+              <a:rPr lang="en-US" dirty="0" smtClean="0"/>
+              <a:t>Tells the resource manager when to run which job on the available resources</a:t>
+            </a:r>
+          </a:p>
+          <a:p>
+            <a:r>
+              <a:rPr lang="en-US" dirty="0"/>
+              <a:t>No longer need to load the </a:t>
+            </a:r>
+            <a:r>
+              <a:rPr lang="en-US" dirty="0" err="1"/>
+              <a:t>Slurm</a:t>
+            </a:r>
+            <a:r>
+              <a:rPr lang="en-US" dirty="0"/>
+              <a:t> module!</a:t>
+            </a:r>
+          </a:p>
+          <a:p>
+            <a:pPr lvl="1"/>
             <a:endParaRPr lang="en-US" dirty="0" smtClean="0"/>
           </a:p>
           <a:p>
-            <a:pPr lvl="1"/>
-            <a:r>
-              <a:rPr lang="en-US" dirty="0" smtClean="0"/>
-              <a:t>Tells what the limits or characteristics of a job should be</a:t>
-            </a:r>
-          </a:p>
-          <a:p>
             <a:pPr lvl="2"/>
-            <a:r>
-              <a:rPr lang="en-US" dirty="0" smtClean="0"/>
-              <a:t>Maximum wall time</a:t>
-            </a:r>
-          </a:p>
-          <a:p>
-            <a:pPr lvl="2"/>
-            <a:r>
-              <a:rPr lang="en-US" dirty="0" smtClean="0"/>
-              <a:t>Number of nodes</a:t>
-            </a:r>
-          </a:p>
-          <a:p>
-            <a:r>
-              <a:rPr lang="en-US" dirty="0" smtClean="0"/>
-              <a:t>One partition might have multiple </a:t>
-            </a:r>
-            <a:r>
-              <a:rPr lang="en-US" dirty="0" err="1" smtClean="0"/>
-              <a:t>QoS</a:t>
-            </a:r>
-            <a:endParaRPr lang="en-US" dirty="0"/>
-          </a:p>
-          <a:p>
-            <a:r>
-              <a:rPr lang="en-US" dirty="0" smtClean="0"/>
-              <a:t>A </a:t>
-            </a:r>
-            <a:r>
-              <a:rPr lang="en-US" dirty="0" err="1" smtClean="0"/>
-              <a:t>QoS</a:t>
-            </a:r>
-            <a:r>
-              <a:rPr lang="en-US" dirty="0" smtClean="0"/>
-              <a:t> might exist on multiple partitions</a:t>
-            </a:r>
+            <a:endParaRPr lang="en-US" dirty="0" smtClean="0"/>
           </a:p>
         </p:txBody>
       </p:sp>
@@ -6367,9 +6297,9 @@
           <a:bodyPr/>
           <a:lstStyle/>
           <a:p>
-            <a:fld id="{0B78EAE2-4C24-6347-B38D-4967A53420D5}" type="datetime1">
-              <a:rPr lang="en-US" smtClean="0"/>
-              <a:t>1/19/17</a:t>
+            <a:fld id="{BED45C82-5CED-1D4D-8A60-2BF62DF704F8}" type="datetime1">
+              <a:rPr lang="en-US" smtClean="0"/>
+              <a:t>3/17/17</a:t>
             </a:fld>
             <a:endParaRPr lang="en-US"/>
           </a:p>
@@ -6377,7 +6307,7 @@
       </p:sp>
       <p:sp>
         <p:nvSpPr>
-          <p:cNvPr id="4" name="Footer Placeholder 3"/>
+          <p:cNvPr id="6" name="Footer Placeholder 5"/>
           <p:cNvSpPr>
             <a:spLocks noGrp="1"/>
           </p:cNvSpPr>
@@ -6425,7 +6355,7 @@
     </p:spTree>
     <p:extLst>
       <p:ext uri="{BB962C8B-B14F-4D97-AF65-F5344CB8AC3E}">
-        <p14:creationId xmlns:p14="http://schemas.microsoft.com/office/powerpoint/2010/main" val="304982320"/>
+        <p14:creationId xmlns:p14="http://schemas.microsoft.com/office/powerpoint/2010/main" val="823288718"/>
       </p:ext>
     </p:extLst>
   </p:cSld>
@@ -6476,7 +6406,7 @@
           <a:p>
             <a:r>
               <a:rPr lang="en-US" dirty="0" smtClean="0"/>
-              <a:t>Partitions</a:t>
+              <a:t>Partitions and ‘Quality of Services’</a:t>
             </a:r>
             <a:endParaRPr lang="en-US" dirty="0"/>
           </a:p>
@@ -6501,6 +6431,368 @@
           <a:p>
             <a:r>
               <a:rPr lang="en-US" dirty="0" smtClean="0"/>
+              <a:t>There are several ways to define where your job will run</a:t>
+            </a:r>
+          </a:p>
+          <a:p>
+            <a:r>
+              <a:rPr lang="en-US" dirty="0" smtClean="0"/>
+              <a:t>Partitions (basically a queue):</a:t>
+            </a:r>
+          </a:p>
+          <a:p>
+            <a:pPr lvl="1"/>
+            <a:r>
+              <a:rPr lang="en-US" dirty="0" smtClean="0"/>
+              <a:t>Resources/hardware</a:t>
+            </a:r>
+          </a:p>
+          <a:p>
+            <a:r>
+              <a:rPr lang="en-US" dirty="0" err="1" smtClean="0"/>
+              <a:t>QoS</a:t>
+            </a:r>
+            <a:r>
+              <a:rPr lang="en-US" dirty="0" smtClean="0">
+                <a:sym typeface="Wingdings"/>
+              </a:rPr>
+              <a:t>:</a:t>
+            </a:r>
+            <a:endParaRPr lang="en-US" dirty="0" smtClean="0"/>
+          </a:p>
+          <a:p>
+            <a:pPr lvl="1"/>
+            <a:r>
+              <a:rPr lang="en-US" dirty="0" smtClean="0"/>
+              <a:t>Tells what the limits or characteristics of a job should be</a:t>
+            </a:r>
+          </a:p>
+          <a:p>
+            <a:pPr lvl="2"/>
+            <a:r>
+              <a:rPr lang="en-US" dirty="0" smtClean="0"/>
+              <a:t>Maximum wall time</a:t>
+            </a:r>
+          </a:p>
+          <a:p>
+            <a:pPr lvl="2"/>
+            <a:r>
+              <a:rPr lang="en-US" dirty="0" smtClean="0"/>
+              <a:t>Number of nodes</a:t>
+            </a:r>
+          </a:p>
+          <a:p>
+            <a:r>
+              <a:rPr lang="en-US" dirty="0" smtClean="0"/>
+              <a:t>One partition might have multiple </a:t>
+            </a:r>
+            <a:r>
+              <a:rPr lang="en-US" dirty="0" err="1" smtClean="0"/>
+              <a:t>QoS</a:t>
+            </a:r>
+            <a:endParaRPr lang="en-US" dirty="0"/>
+          </a:p>
+          <a:p>
+            <a:r>
+              <a:rPr lang="en-US" dirty="0" smtClean="0"/>
+              <a:t>A </a:t>
+            </a:r>
+            <a:r>
+              <a:rPr lang="en-US" dirty="0" err="1" smtClean="0"/>
+              <a:t>QoS</a:t>
+            </a:r>
+            <a:r>
+              <a:rPr lang="en-US" dirty="0" smtClean="0"/>
+              <a:t> might exist on multiple partitions</a:t>
+            </a:r>
+          </a:p>
+        </p:txBody>
+      </p:sp>
+      <p:sp>
+        <p:nvSpPr>
+          <p:cNvPr id="5" name="Date Placeholder 4"/>
+          <p:cNvSpPr>
+            <a:spLocks noGrp="1"/>
+          </p:cNvSpPr>
+          <p:nvPr>
+            <p:ph type="dt" sz="half" idx="10"/>
+          </p:nvPr>
+        </p:nvSpPr>
+        <p:spPr/>
+        <p:txBody>
+          <a:bodyPr/>
+          <a:lstStyle/>
+          <a:p>
+            <a:fld id="{0B78EAE2-4C24-6347-B38D-4967A53420D5}" type="datetime1">
+              <a:rPr lang="en-US" smtClean="0"/>
+              <a:t>3/17/17</a:t>
+            </a:fld>
+            <a:endParaRPr lang="en-US"/>
+          </a:p>
+        </p:txBody>
+      </p:sp>
+      <p:sp>
+        <p:nvSpPr>
+          <p:cNvPr id="4" name="Footer Placeholder 3"/>
+          <p:cNvSpPr>
+            <a:spLocks noGrp="1"/>
+          </p:cNvSpPr>
+          <p:nvPr>
+            <p:ph type="ftr" sz="quarter" idx="11"/>
+          </p:nvPr>
+        </p:nvSpPr>
+        <p:spPr/>
+        <p:txBody>
+          <a:bodyPr/>
+          <a:lstStyle/>
+          <a:p>
+            <a:r>
+              <a:rPr lang="en-US" smtClean="0"/>
+              <a:t>Basics of Supercomputing</a:t>
+            </a:r>
+            <a:endParaRPr lang="en-US" dirty="0"/>
+          </a:p>
+        </p:txBody>
+      </p:sp>
+      <p:sp>
+        <p:nvSpPr>
+          <p:cNvPr id="21" name="Slide Number Placeholder 20"/>
+          <p:cNvSpPr>
+            <a:spLocks noGrp="1"/>
+          </p:cNvSpPr>
+          <p:nvPr>
+            <p:ph type="sldNum" sz="quarter" idx="4"/>
+          </p:nvPr>
+        </p:nvSpPr>
+        <p:spPr/>
+        <p:txBody>
+          <a:bodyPr/>
+          <a:lstStyle/>
+          <a:p>
+            <a:fld id="{249E94F7-107C-CE46-8C56-9CACFF99CD93}" type="slidenum">
+              <a:rPr lang="en-US" smtClean="0"/>
+              <a:pPr/>
+              <a:t>19</a:t>
+            </a:fld>
+            <a:endParaRPr lang="en-US" dirty="0"/>
+          </a:p>
+        </p:txBody>
+      </p:sp>
+    </p:spTree>
+    <p:extLst>
+      <p:ext uri="{BB962C8B-B14F-4D97-AF65-F5344CB8AC3E}">
+        <p14:creationId xmlns:p14="http://schemas.microsoft.com/office/powerpoint/2010/main" val="304982320"/>
+      </p:ext>
+    </p:extLst>
+  </p:cSld>
+  <p:clrMapOvr>
+    <a:masterClrMapping/>
+  </p:clrMapOvr>
+  <p:timing>
+    <p:tnLst>
+      <p:par>
+        <p:cTn id="1" dur="indefinite" restart="never" nodeType="tmRoot"/>
+      </p:par>
+    </p:tnLst>
+  </p:timing>
+</p:sld>
+</file>
+
+<file path=ppt/slides/slide2.xml><?xml version="1.0" encoding="utf-8"?>
+<p:sld xmlns:a="http://schemas.openxmlformats.org/drawingml/2006/main" xmlns:r="http://schemas.openxmlformats.org/officeDocument/2006/relationships" xmlns:p="http://schemas.openxmlformats.org/presentationml/2006/main">
+  <p:cSld>
+    <p:spTree>
+      <p:nvGrpSpPr>
+        <p:cNvPr id="1" name=""/>
+        <p:cNvGrpSpPr/>
+        <p:nvPr/>
+      </p:nvGrpSpPr>
+      <p:grpSpPr>
+        <a:xfrm>
+          <a:off x="0" y="0"/>
+          <a:ext cx="0" cy="0"/>
+          <a:chOff x="0" y="0"/>
+          <a:chExt cx="0" cy="0"/>
+        </a:xfrm>
+      </p:grpSpPr>
+      <p:sp>
+        <p:nvSpPr>
+          <p:cNvPr id="2" name="Title 1"/>
+          <p:cNvSpPr>
+            <a:spLocks noGrp="1"/>
+          </p:cNvSpPr>
+          <p:nvPr>
+            <p:ph type="title"/>
+          </p:nvPr>
+        </p:nvSpPr>
+        <p:spPr>
+          <a:xfrm>
+            <a:off x="457200" y="2798898"/>
+            <a:ext cx="8191532" cy="1143000"/>
+          </a:xfrm>
+        </p:spPr>
+        <p:txBody>
+          <a:bodyPr/>
+          <a:lstStyle/>
+          <a:p>
+            <a:pPr algn="ctr"/>
+            <a:r>
+              <a:rPr lang="en-US" smtClean="0"/>
+              <a:t>General Information</a:t>
+            </a:r>
+            <a:endParaRPr lang="en-US"/>
+          </a:p>
+        </p:txBody>
+      </p:sp>
+      <p:sp>
+        <p:nvSpPr>
+          <p:cNvPr id="4" name="Date Placeholder 3"/>
+          <p:cNvSpPr>
+            <a:spLocks noGrp="1"/>
+          </p:cNvSpPr>
+          <p:nvPr>
+            <p:ph type="dt" sz="half" idx="10"/>
+          </p:nvPr>
+        </p:nvSpPr>
+        <p:spPr/>
+        <p:txBody>
+          <a:bodyPr/>
+          <a:lstStyle/>
+          <a:p>
+            <a:fld id="{EF0CA858-4E4A-1E41-B7CC-25112B7BAD8B}" type="datetime1">
+              <a:rPr lang="en-US" smtClean="0"/>
+              <a:t>3/17/17</a:t>
+            </a:fld>
+            <a:endParaRPr lang="en-US" dirty="0"/>
+          </a:p>
+        </p:txBody>
+      </p:sp>
+      <p:sp>
+        <p:nvSpPr>
+          <p:cNvPr id="5" name="Footer Placeholder 4"/>
+          <p:cNvSpPr>
+            <a:spLocks noGrp="1"/>
+          </p:cNvSpPr>
+          <p:nvPr>
+            <p:ph type="ftr" sz="quarter" idx="11"/>
+          </p:nvPr>
+        </p:nvSpPr>
+        <p:spPr/>
+        <p:txBody>
+          <a:bodyPr/>
+          <a:lstStyle/>
+          <a:p>
+            <a:r>
+              <a:rPr lang="en-US" smtClean="0"/>
+              <a:t>Basics of Supercomputing</a:t>
+            </a:r>
+            <a:endParaRPr lang="en-US" dirty="0"/>
+          </a:p>
+        </p:txBody>
+      </p:sp>
+      <p:sp>
+        <p:nvSpPr>
+          <p:cNvPr id="6" name="Slide Number Placeholder 5"/>
+          <p:cNvSpPr>
+            <a:spLocks noGrp="1"/>
+          </p:cNvSpPr>
+          <p:nvPr>
+            <p:ph type="sldNum" sz="quarter" idx="4"/>
+          </p:nvPr>
+        </p:nvSpPr>
+        <p:spPr/>
+        <p:txBody>
+          <a:bodyPr/>
+          <a:lstStyle/>
+          <a:p>
+            <a:fld id="{249E94F7-107C-CE46-8C56-9CACFF99CD93}" type="slidenum">
+              <a:rPr lang="en-US" smtClean="0"/>
+              <a:pPr/>
+              <a:t>2</a:t>
+            </a:fld>
+            <a:endParaRPr lang="en-US" dirty="0"/>
+          </a:p>
+        </p:txBody>
+      </p:sp>
+    </p:spTree>
+    <p:extLst>
+      <p:ext uri="{BB962C8B-B14F-4D97-AF65-F5344CB8AC3E}">
+        <p14:creationId xmlns:p14="http://schemas.microsoft.com/office/powerpoint/2010/main" val="535231668"/>
+      </p:ext>
+    </p:extLst>
+  </p:cSld>
+  <p:clrMapOvr>
+    <a:masterClrMapping/>
+  </p:clrMapOvr>
+  <p:timing>
+    <p:tnLst>
+      <p:par>
+        <p:cTn id="1" dur="indefinite" restart="never" nodeType="tmRoot"/>
+      </p:par>
+    </p:tnLst>
+  </p:timing>
+</p:sld>
+</file>
+
+<file path=ppt/slides/slide20.xml><?xml version="1.0" encoding="utf-8"?>
+<p:sld xmlns:a="http://schemas.openxmlformats.org/drawingml/2006/main" xmlns:r="http://schemas.openxmlformats.org/officeDocument/2006/relationships" xmlns:p="http://schemas.openxmlformats.org/presentationml/2006/main">
+  <p:cSld>
+    <p:spTree>
+      <p:nvGrpSpPr>
+        <p:cNvPr id="1" name=""/>
+        <p:cNvGrpSpPr/>
+        <p:nvPr/>
+      </p:nvGrpSpPr>
+      <p:grpSpPr>
+        <a:xfrm>
+          <a:off x="0" y="0"/>
+          <a:ext cx="0" cy="0"/>
+          <a:chOff x="0" y="0"/>
+          <a:chExt cx="0" cy="0"/>
+        </a:xfrm>
+      </p:grpSpPr>
+      <p:sp>
+        <p:nvSpPr>
+          <p:cNvPr id="2" name="Title 1"/>
+          <p:cNvSpPr>
+            <a:spLocks noGrp="1"/>
+          </p:cNvSpPr>
+          <p:nvPr>
+            <p:ph type="title"/>
+          </p:nvPr>
+        </p:nvSpPr>
+        <p:spPr/>
+        <p:txBody>
+          <a:bodyPr/>
+          <a:lstStyle/>
+          <a:p>
+            <a:r>
+              <a:rPr lang="en-US" dirty="0" smtClean="0"/>
+              <a:t>Partitions</a:t>
+            </a:r>
+            <a:endParaRPr lang="en-US" dirty="0"/>
+          </a:p>
+        </p:txBody>
+      </p:sp>
+      <p:sp>
+        <p:nvSpPr>
+          <p:cNvPr id="3" name="Content Placeholder 2"/>
+          <p:cNvSpPr>
+            <a:spLocks noGrp="1"/>
+          </p:cNvSpPr>
+          <p:nvPr>
+            <p:ph idx="1"/>
+          </p:nvPr>
+        </p:nvSpPr>
+        <p:spPr/>
+        <p:txBody>
+          <a:bodyPr>
+            <a:normAutofit/>
+          </a:bodyPr>
+          <a:lstStyle/>
+          <a:p>
+            <a:r>
+              <a:rPr lang="en-US" dirty="0" smtClean="0"/>
               <a:t>By default, jobs will run on the general compute (Haswell) nodes</a:t>
             </a:r>
           </a:p>
@@ -6542,7 +6834,7 @@
           <a:p>
             <a:fld id="{0B78EAE2-4C24-6347-B38D-4967A53420D5}" type="datetime1">
               <a:rPr lang="en-US" smtClean="0"/>
-              <a:t>1/19/17</a:t>
+              <a:t>3/17/17</a:t>
             </a:fld>
             <a:endParaRPr lang="en-US"/>
           </a:p>
@@ -6589,7 +6881,7 @@
             <a:fld id="{249E94F7-107C-CE46-8C56-9CACFF99CD93}" type="slidenum">
               <a:rPr lang="en-US" smtClean="0"/>
               <a:pPr/>
-              <a:t>19</a:t>
+              <a:t>20</a:t>
             </a:fld>
             <a:endParaRPr lang="en-US" dirty="0"/>
           </a:p>
@@ -6733,7 +7025,7 @@
 </p:sld>
 </file>
 
-<file path=ppt/slides/slide2.xml><?xml version="1.0" encoding="utf-8"?>
+<file path=ppt/slides/slide21.xml><?xml version="1.0" encoding="utf-8"?>
 <p:sld xmlns:a="http://schemas.openxmlformats.org/drawingml/2006/main" xmlns:r="http://schemas.openxmlformats.org/officeDocument/2006/relationships" xmlns:p="http://schemas.openxmlformats.org/presentationml/2006/main">
   <p:cSld>
     <p:spTree>
@@ -6760,142 +7052,6 @@
             <p:ph type="title"/>
           </p:nvPr>
         </p:nvSpPr>
-        <p:spPr>
-          <a:xfrm>
-            <a:off x="457200" y="2798898"/>
-            <a:ext cx="8191532" cy="1143000"/>
-          </a:xfrm>
-        </p:spPr>
-        <p:txBody>
-          <a:bodyPr/>
-          <a:lstStyle/>
-          <a:p>
-            <a:pPr algn="ctr"/>
-            <a:r>
-              <a:rPr lang="en-US" smtClean="0"/>
-              <a:t>General Information</a:t>
-            </a:r>
-            <a:endParaRPr lang="en-US"/>
-          </a:p>
-        </p:txBody>
-      </p:sp>
-      <p:sp>
-        <p:nvSpPr>
-          <p:cNvPr id="4" name="Date Placeholder 3"/>
-          <p:cNvSpPr>
-            <a:spLocks noGrp="1"/>
-          </p:cNvSpPr>
-          <p:nvPr>
-            <p:ph type="dt" sz="half" idx="10"/>
-          </p:nvPr>
-        </p:nvSpPr>
-        <p:spPr/>
-        <p:txBody>
-          <a:bodyPr/>
-          <a:lstStyle/>
-          <a:p>
-            <a:fld id="{EF0CA858-4E4A-1E41-B7CC-25112B7BAD8B}" type="datetime1">
-              <a:rPr lang="en-US" smtClean="0"/>
-              <a:t>1/19/17</a:t>
-            </a:fld>
-            <a:endParaRPr lang="en-US" dirty="0"/>
-          </a:p>
-        </p:txBody>
-      </p:sp>
-      <p:sp>
-        <p:nvSpPr>
-          <p:cNvPr id="5" name="Footer Placeholder 4"/>
-          <p:cNvSpPr>
-            <a:spLocks noGrp="1"/>
-          </p:cNvSpPr>
-          <p:nvPr>
-            <p:ph type="ftr" sz="quarter" idx="11"/>
-          </p:nvPr>
-        </p:nvSpPr>
-        <p:spPr/>
-        <p:txBody>
-          <a:bodyPr/>
-          <a:lstStyle/>
-          <a:p>
-            <a:r>
-              <a:rPr lang="en-US" smtClean="0"/>
-              <a:t>Basics of Supercomputing</a:t>
-            </a:r>
-            <a:endParaRPr lang="en-US" dirty="0"/>
-          </a:p>
-        </p:txBody>
-      </p:sp>
-      <p:sp>
-        <p:nvSpPr>
-          <p:cNvPr id="6" name="Slide Number Placeholder 5"/>
-          <p:cNvSpPr>
-            <a:spLocks noGrp="1"/>
-          </p:cNvSpPr>
-          <p:nvPr>
-            <p:ph type="sldNum" sz="quarter" idx="4"/>
-          </p:nvPr>
-        </p:nvSpPr>
-        <p:spPr/>
-        <p:txBody>
-          <a:bodyPr/>
-          <a:lstStyle/>
-          <a:p>
-            <a:fld id="{249E94F7-107C-CE46-8C56-9CACFF99CD93}" type="slidenum">
-              <a:rPr lang="en-US" smtClean="0"/>
-              <a:pPr/>
-              <a:t>2</a:t>
-            </a:fld>
-            <a:endParaRPr lang="en-US" dirty="0"/>
-          </a:p>
-        </p:txBody>
-      </p:sp>
-    </p:spTree>
-    <p:extLst>
-      <p:ext uri="{BB962C8B-B14F-4D97-AF65-F5344CB8AC3E}">
-        <p14:creationId xmlns:p14="http://schemas.microsoft.com/office/powerpoint/2010/main" val="535231668"/>
-      </p:ext>
-    </p:extLst>
-  </p:cSld>
-  <p:clrMapOvr>
-    <a:masterClrMapping/>
-  </p:clrMapOvr>
-  <p:timing>
-    <p:tnLst>
-      <p:par>
-        <p:cTn id="1" dur="indefinite" restart="never" nodeType="tmRoot"/>
-      </p:par>
-    </p:tnLst>
-  </p:timing>
-</p:sld>
-</file>
-
-<file path=ppt/slides/slide20.xml><?xml version="1.0" encoding="utf-8"?>
-<p:sld xmlns:a="http://schemas.openxmlformats.org/drawingml/2006/main" xmlns:r="http://schemas.openxmlformats.org/officeDocument/2006/relationships" xmlns:p="http://schemas.openxmlformats.org/presentationml/2006/main">
-  <p:cSld>
-    <p:spTree>
-      <p:nvGrpSpPr>
-        <p:cNvPr id="1" name=""/>
-        <p:cNvGrpSpPr/>
-        <p:nvPr/>
-      </p:nvGrpSpPr>
-      <p:grpSpPr>
-        <a:xfrm>
-          <a:off x="0" y="0"/>
-          <a:ext cx="0" cy="0"/>
-          <a:chOff x="0" y="0"/>
-          <a:chExt cx="0" cy="0"/>
-        </a:xfrm>
-      </p:grpSpPr>
-      <p:sp>
-        <p:nvSpPr>
-          <p:cNvPr id="2" name="Title 1"/>
-          <p:cNvSpPr>
-            <a:spLocks noGrp="1"/>
-          </p:cNvSpPr>
-          <p:nvPr>
-            <p:ph type="title"/>
-          </p:nvPr>
-        </p:nvSpPr>
         <p:spPr/>
         <p:txBody>
           <a:bodyPr/>
@@ -6926,7 +7082,7 @@
           <a:p>
             <a:fld id="{0B78EAE2-4C24-6347-B38D-4967A53420D5}" type="datetime1">
               <a:rPr lang="en-US" smtClean="0"/>
-              <a:t>1/19/17</a:t>
+              <a:t>3/17/17</a:t>
             </a:fld>
             <a:endParaRPr lang="en-US"/>
           </a:p>
@@ -6973,7 +7129,7 @@
             <a:fld id="{249E94F7-107C-CE46-8C56-9CACFF99CD93}" type="slidenum">
               <a:rPr lang="en-US" smtClean="0"/>
               <a:pPr/>
-              <a:t>20</a:t>
+              <a:t>21</a:t>
             </a:fld>
             <a:endParaRPr lang="en-US" dirty="0"/>
           </a:p>
@@ -8835,7 +8991,7 @@
 </p:sld>
 </file>
 
-<file path=ppt/slides/slide21.xml><?xml version="1.0" encoding="utf-8"?>
+<file path=ppt/slides/slide22.xml><?xml version="1.0" encoding="utf-8"?>
 <p:sld xmlns:a="http://schemas.openxmlformats.org/drawingml/2006/main" xmlns:r="http://schemas.openxmlformats.org/officeDocument/2006/relationships" xmlns:p="http://schemas.openxmlformats.org/presentationml/2006/main">
   <p:cSld>
     <p:spTree>
@@ -8892,7 +9048,7 @@
           <a:p>
             <a:fld id="{90257BA9-CFE4-9D47-98D1-5915D914964A}" type="datetime1">
               <a:rPr lang="en-US" smtClean="0"/>
-              <a:t>1/19/17</a:t>
+              <a:t>3/17/17</a:t>
             </a:fld>
             <a:endParaRPr lang="en-US"/>
           </a:p>
@@ -8939,7 +9095,7 @@
             <a:fld id="{249E94F7-107C-CE46-8C56-9CACFF99CD93}" type="slidenum">
               <a:rPr lang="en-US" smtClean="0"/>
               <a:pPr/>
-              <a:t>21</a:t>
+              <a:t>22</a:t>
             </a:fld>
             <a:endParaRPr lang="en-US" dirty="0"/>
           </a:p>
@@ -10881,222 +11037,6 @@
 </p:sld>
 </file>
 
-<file path=ppt/slides/slide22.xml><?xml version="1.0" encoding="utf-8"?>
-<p:sld xmlns:a="http://schemas.openxmlformats.org/drawingml/2006/main" xmlns:r="http://schemas.openxmlformats.org/officeDocument/2006/relationships" xmlns:p="http://schemas.openxmlformats.org/presentationml/2006/main">
-  <p:cSld>
-    <p:spTree>
-      <p:nvGrpSpPr>
-        <p:cNvPr id="1" name=""/>
-        <p:cNvGrpSpPr/>
-        <p:nvPr/>
-      </p:nvGrpSpPr>
-      <p:grpSpPr>
-        <a:xfrm>
-          <a:off x="0" y="0"/>
-          <a:ext cx="0" cy="0"/>
-          <a:chOff x="0" y="0"/>
-          <a:chExt cx="0" cy="0"/>
-        </a:xfrm>
-      </p:grpSpPr>
-      <p:sp>
-        <p:nvSpPr>
-          <p:cNvPr id="2" name="Title 1"/>
-          <p:cNvSpPr>
-            <a:spLocks noGrp="1"/>
-          </p:cNvSpPr>
-          <p:nvPr>
-            <p:ph type="title"/>
-          </p:nvPr>
-        </p:nvSpPr>
-        <p:spPr/>
-        <p:txBody>
-          <a:bodyPr/>
-          <a:lstStyle/>
-          <a:p>
-            <a:r>
-              <a:rPr lang="en-US" dirty="0" smtClean="0"/>
-              <a:t>Allocations</a:t>
-            </a:r>
-            <a:endParaRPr lang="en-US" dirty="0"/>
-          </a:p>
-        </p:txBody>
-      </p:sp>
-      <p:sp>
-        <p:nvSpPr>
-          <p:cNvPr id="3" name="Content Placeholder 2"/>
-          <p:cNvSpPr>
-            <a:spLocks noGrp="1"/>
-          </p:cNvSpPr>
-          <p:nvPr>
-            <p:ph idx="1"/>
-          </p:nvPr>
-        </p:nvSpPr>
-        <p:spPr/>
-        <p:txBody>
-          <a:bodyPr>
-            <a:normAutofit lnSpcReduction="10000"/>
-          </a:bodyPr>
-          <a:lstStyle/>
-          <a:p>
-            <a:r>
-              <a:rPr lang="en-US" dirty="0" smtClean="0"/>
-              <a:t>Moving to a fair-share allocation</a:t>
-            </a:r>
-          </a:p>
-          <a:p>
-            <a:r>
-              <a:rPr lang="en-US" dirty="0" smtClean="0"/>
-              <a:t>Users should no longer think of allocations as a bank account</a:t>
-            </a:r>
-          </a:p>
-          <a:p>
-            <a:pPr lvl="1"/>
-            <a:r>
-              <a:rPr lang="en-US" dirty="0" smtClean="0"/>
-              <a:t>No longer get a certain number of hours</a:t>
-            </a:r>
-          </a:p>
-          <a:p>
-            <a:r>
-              <a:rPr lang="en-US" dirty="0" smtClean="0"/>
-              <a:t>Now get a share of a computer at any given time</a:t>
-            </a:r>
-          </a:p>
-          <a:p>
-            <a:pPr lvl="1"/>
-            <a:r>
-              <a:rPr lang="en-US" dirty="0" smtClean="0"/>
-              <a:t>Averaged over a 3-4 week period</a:t>
-            </a:r>
-          </a:p>
-          <a:p>
-            <a:endParaRPr lang="en-US" dirty="0" smtClean="0"/>
-          </a:p>
-          <a:p>
-            <a:r>
-              <a:rPr lang="en-US" dirty="0" smtClean="0"/>
-              <a:t>Motivation </a:t>
-            </a:r>
-            <a:r>
-              <a:rPr lang="en-US" dirty="0"/>
-              <a:t>for fair share:</a:t>
-            </a:r>
-          </a:p>
-          <a:p>
-            <a:pPr lvl="1"/>
-            <a:r>
-              <a:rPr lang="en-US" dirty="0"/>
-              <a:t>More universities involved, so rather than just allocate a percentage gives everyone a target</a:t>
-            </a:r>
-          </a:p>
-          <a:p>
-            <a:pPr lvl="1"/>
-            <a:r>
-              <a:rPr lang="en-US" dirty="0"/>
-              <a:t>Also prevents the system from being </a:t>
-            </a:r>
-            <a:r>
-              <a:rPr lang="en-US" dirty="0" smtClean="0"/>
-              <a:t>idle</a:t>
-            </a:r>
-          </a:p>
-          <a:p>
-            <a:pPr lvl="1"/>
-            <a:r>
-              <a:rPr lang="en-US" dirty="0" smtClean="0"/>
-              <a:t>No more fuss of worrying if ran out of allocation time</a:t>
-            </a:r>
-            <a:endParaRPr lang="en-US" dirty="0"/>
-          </a:p>
-          <a:p>
-            <a:pPr lvl="1"/>
-            <a:endParaRPr lang="en-US" dirty="0" smtClean="0"/>
-          </a:p>
-        </p:txBody>
-      </p:sp>
-      <p:sp>
-        <p:nvSpPr>
-          <p:cNvPr id="4" name="Date Placeholder 3"/>
-          <p:cNvSpPr>
-            <a:spLocks noGrp="1"/>
-          </p:cNvSpPr>
-          <p:nvPr>
-            <p:ph type="dt" sz="half" idx="10"/>
-          </p:nvPr>
-        </p:nvSpPr>
-        <p:spPr/>
-        <p:txBody>
-          <a:bodyPr/>
-          <a:lstStyle/>
-          <a:p>
-            <a:fld id="{EF0CA858-4E4A-1E41-B7CC-25112B7BAD8B}" type="datetime1">
-              <a:rPr lang="en-US" smtClean="0"/>
-              <a:t>1/19/17</a:t>
-            </a:fld>
-            <a:endParaRPr lang="en-US" dirty="0"/>
-          </a:p>
-        </p:txBody>
-      </p:sp>
-      <p:sp>
-        <p:nvSpPr>
-          <p:cNvPr id="5" name="Footer Placeholder 4"/>
-          <p:cNvSpPr>
-            <a:spLocks noGrp="1"/>
-          </p:cNvSpPr>
-          <p:nvPr>
-            <p:ph type="ftr" sz="quarter" idx="11"/>
-          </p:nvPr>
-        </p:nvSpPr>
-        <p:spPr/>
-        <p:txBody>
-          <a:bodyPr/>
-          <a:lstStyle/>
-          <a:p>
-            <a:r>
-              <a:rPr lang="en-US" smtClean="0"/>
-              <a:t>Basics of Supercomputing</a:t>
-            </a:r>
-            <a:endParaRPr lang="en-US" dirty="0"/>
-          </a:p>
-        </p:txBody>
-      </p:sp>
-      <p:sp>
-        <p:nvSpPr>
-          <p:cNvPr id="6" name="Slide Number Placeholder 5"/>
-          <p:cNvSpPr>
-            <a:spLocks noGrp="1"/>
-          </p:cNvSpPr>
-          <p:nvPr>
-            <p:ph type="sldNum" sz="quarter" idx="4"/>
-          </p:nvPr>
-        </p:nvSpPr>
-        <p:spPr/>
-        <p:txBody>
-          <a:bodyPr/>
-          <a:lstStyle/>
-          <a:p>
-            <a:fld id="{249E94F7-107C-CE46-8C56-9CACFF99CD93}" type="slidenum">
-              <a:rPr lang="en-US" smtClean="0"/>
-              <a:pPr/>
-              <a:t>22</a:t>
-            </a:fld>
-            <a:endParaRPr lang="en-US" dirty="0"/>
-          </a:p>
-        </p:txBody>
-      </p:sp>
-    </p:spTree>
-    <p:extLst>
-      <p:ext uri="{BB962C8B-B14F-4D97-AF65-F5344CB8AC3E}">
-        <p14:creationId xmlns:p14="http://schemas.microsoft.com/office/powerpoint/2010/main" val="1128205865"/>
-      </p:ext>
-    </p:extLst>
-  </p:cSld>
-  <p:clrMapOvr>
-    <a:masterClrMapping/>
-  </p:clrMapOvr>
-</p:sld>
-</file>
-
 <file path=ppt/slides/slide23.xml><?xml version="1.0" encoding="utf-8"?>
 <p:sld xmlns:a="http://schemas.openxmlformats.org/drawingml/2006/main" xmlns:r="http://schemas.openxmlformats.org/officeDocument/2006/relationships" xmlns:p="http://schemas.openxmlformats.org/presentationml/2006/main">
   <p:cSld>
@@ -11131,7 +11071,7 @@
           <a:p>
             <a:r>
               <a:rPr lang="en-US" dirty="0" smtClean="0"/>
-              <a:t>What is Fair Share?</a:t>
+              <a:t>Allocations</a:t>
             </a:r>
             <a:endParaRPr lang="en-US" dirty="0"/>
           </a:p>
@@ -11156,45 +11096,77 @@
           <a:p>
             <a:r>
               <a:rPr lang="en-US" dirty="0" smtClean="0"/>
-              <a:t>Fair share scheduling uses a complex formula to determine priority in queue</a:t>
+              <a:t>Moving to a fair-share allocation</a:t>
             </a:r>
           </a:p>
           <a:p>
             <a:r>
               <a:rPr lang="en-US" dirty="0" smtClean="0"/>
-              <a:t>Looks at load for each user and each QOS and balances utilization to fairly share resources</a:t>
+              <a:t>Users should no longer think of allocations as a bank account</a:t>
             </a:r>
           </a:p>
           <a:p>
             <a:pPr lvl="1"/>
             <a:r>
               <a:rPr lang="en-US" dirty="0" smtClean="0"/>
-              <a:t>Involves historical use by user and by QOS plus how long job has been in the queue</a:t>
+              <a:t>No longer get a certain number of hours</a:t>
+            </a:r>
+          </a:p>
+          <a:p>
+            <a:r>
+              <a:rPr lang="en-US" dirty="0" smtClean="0"/>
+              <a:t>Now get a share of a computer at any given time</a:t>
             </a:r>
           </a:p>
           <a:p>
             <a:pPr lvl="1"/>
             <a:r>
               <a:rPr lang="en-US" dirty="0" smtClean="0"/>
-              <a:t>Each is weighted differently</a:t>
+              <a:t>Averaged over a 3-4 week period</a:t>
+            </a:r>
+          </a:p>
+          <a:p>
+            <a:endParaRPr lang="en-US" dirty="0" smtClean="0"/>
+          </a:p>
+          <a:p>
+            <a:r>
+              <a:rPr lang="en-US" dirty="0" smtClean="0"/>
+              <a:t>Motivation </a:t>
+            </a:r>
+            <a:r>
+              <a:rPr lang="en-US" dirty="0"/>
+              <a:t>for fair share:</a:t>
             </a:r>
           </a:p>
           <a:p>
             <a:pPr lvl="1"/>
+            <a:r>
+              <a:rPr lang="en-US" dirty="0"/>
+              <a:t>More universities involved, so rather than just allocate a percentage gives everyone a target</a:t>
+            </a:r>
+          </a:p>
+          <a:p>
+            <a:pPr lvl="1"/>
+            <a:r>
+              <a:rPr lang="en-US" dirty="0"/>
+              <a:t>Also prevents the system from being </a:t>
+            </a:r>
+            <a:r>
+              <a:rPr lang="en-US" dirty="0" smtClean="0"/>
+              <a:t>idle</a:t>
+            </a:r>
+          </a:p>
+          <a:p>
+            <a:pPr lvl="1"/>
+            <a:r>
+              <a:rPr lang="en-US" dirty="0" smtClean="0"/>
+              <a:t>No more fuss of worrying if ran out of allocation time</a:t>
+            </a:r>
             <a:endParaRPr lang="en-US" dirty="0"/>
           </a:p>
           <a:p>
-            <a:r>
-              <a:rPr lang="en-US" dirty="0" smtClean="0"/>
-              <a:t>System will first look at weighted average utilization of user over last 3-4 weeks</a:t>
-            </a:r>
-          </a:p>
-          <a:p>
-            <a:r>
-              <a:rPr lang="en-US" dirty="0" smtClean="0"/>
-              <a:t>Then compare it to the fair share target percentage of a user </a:t>
-            </a:r>
-            <a:endParaRPr lang="en-US" dirty="0"/>
+            <a:pPr lvl="1"/>
+            <a:endParaRPr lang="en-US" dirty="0" smtClean="0"/>
           </a:p>
         </p:txBody>
       </p:sp>
@@ -11215,7 +11187,7 @@
           <a:p>
             <a:fld id="{EF0CA858-4E4A-1E41-B7CC-25112B7BAD8B}" type="datetime1">
               <a:rPr lang="en-US" smtClean="0"/>
-              <a:t>1/19/17</a:t>
+              <a:t>3/17/17</a:t>
             </a:fld>
             <a:endParaRPr lang="en-US" dirty="0"/>
           </a:p>
@@ -11271,7 +11243,7 @@
     </p:spTree>
     <p:extLst>
       <p:ext uri="{BB962C8B-B14F-4D97-AF65-F5344CB8AC3E}">
-        <p14:creationId xmlns:p14="http://schemas.microsoft.com/office/powerpoint/2010/main" val="708331907"/>
+        <p14:creationId xmlns:p14="http://schemas.microsoft.com/office/powerpoint/2010/main" val="1128205865"/>
       </p:ext>
     </p:extLst>
   </p:cSld>
@@ -11315,7 +11287,7 @@
           <a:p>
             <a:r>
               <a:rPr lang="en-US" dirty="0" smtClean="0"/>
-              <a:t>Fair Share Target Percentage</a:t>
+              <a:t>What is Fair Share?</a:t>
             </a:r>
             <a:endParaRPr lang="en-US" dirty="0"/>
           </a:p>
@@ -11334,40 +11306,51 @@
         <p:spPr/>
         <p:txBody>
           <a:bodyPr>
-            <a:normAutofit/>
+            <a:normAutofit lnSpcReduction="10000"/>
           </a:bodyPr>
           <a:lstStyle/>
           <a:p>
             <a:r>
               <a:rPr lang="en-US" dirty="0" smtClean="0"/>
-              <a:t>The target percentage depends on your priority based on your project proposal</a:t>
+              <a:t>Fair share scheduling uses a complex formula to determine priority in queue</a:t>
             </a:r>
           </a:p>
           <a:p>
             <a:r>
               <a:rPr lang="en-US" dirty="0" smtClean="0"/>
-              <a:t>Everyone not associated with a project shares a target percentage of 13% (20% of the CU fraction)</a:t>
+              <a:t>Looks at load for each user and each QOS and balances utilization to fairly share resources</a:t>
             </a:r>
           </a:p>
           <a:p>
             <a:pPr lvl="1"/>
             <a:r>
               <a:rPr lang="en-US" dirty="0" smtClean="0"/>
-              <a:t>No guaranteed level per user</a:t>
-            </a:r>
+              <a:t>Involves historical use by user and by QOS plus how long job has been in the queue</a:t>
+            </a:r>
+          </a:p>
+          <a:p>
+            <a:pPr lvl="1"/>
+            <a:r>
+              <a:rPr lang="en-US" dirty="0" smtClean="0"/>
+              <a:t>Each is weighted differently</a:t>
+            </a:r>
+          </a:p>
+          <a:p>
+            <a:pPr lvl="1"/>
             <a:endParaRPr lang="en-US" dirty="0"/>
           </a:p>
           <a:p>
             <a:r>
               <a:rPr lang="en-US" dirty="0" smtClean="0"/>
-              <a:t>If you are under your target percentage (based on a 3-4 week average) your priority is increased</a:t>
+              <a:t>System will first look at weighted average utilization of user over last 3-4 weeks</a:t>
             </a:r>
           </a:p>
           <a:p>
             <a:r>
               <a:rPr lang="en-US" dirty="0" smtClean="0"/>
-              <a:t>If you are over your target percentage (based on a 3-4 week average) your priority is decreased</a:t>
-            </a:r>
+              <a:t>Then compare it to the fair share target percentage of a user </a:t>
+            </a:r>
+            <a:endParaRPr lang="en-US" dirty="0"/>
           </a:p>
         </p:txBody>
       </p:sp>
@@ -11388,7 +11371,7 @@
           <a:p>
             <a:fld id="{EF0CA858-4E4A-1E41-B7CC-25112B7BAD8B}" type="datetime1">
               <a:rPr lang="en-US" smtClean="0"/>
-              <a:t>1/19/17</a:t>
+              <a:t>3/17/17</a:t>
             </a:fld>
             <a:endParaRPr lang="en-US" dirty="0"/>
           </a:p>
@@ -11444,7 +11427,7 @@
     </p:spTree>
     <p:extLst>
       <p:ext uri="{BB962C8B-B14F-4D97-AF65-F5344CB8AC3E}">
-        <p14:creationId xmlns:p14="http://schemas.microsoft.com/office/powerpoint/2010/main" val="1095693951"/>
+        <p14:creationId xmlns:p14="http://schemas.microsoft.com/office/powerpoint/2010/main" val="708331907"/>
       </p:ext>
     </p:extLst>
   </p:cSld>
@@ -11488,15 +11471,7 @@
           <a:p>
             <a:r>
               <a:rPr lang="en-US" dirty="0" smtClean="0"/>
-              <a:t>Fair Share Allocation (</a:t>
-            </a:r>
-            <a:r>
-              <a:rPr lang="en-US" dirty="0" err="1" smtClean="0"/>
-              <a:t>Cont</a:t>
-            </a:r>
-            <a:r>
-              <a:rPr lang="en-US" dirty="0" smtClean="0"/>
-              <a:t>)</a:t>
+              <a:t>Fair Share Target Percentage</a:t>
             </a:r>
             <a:endParaRPr lang="en-US" dirty="0"/>
           </a:p>
@@ -11521,33 +11496,34 @@
           <a:p>
             <a:r>
               <a:rPr lang="en-US" dirty="0" smtClean="0"/>
-              <a:t>Once the system determines the priority based on historical use of the user as well as target percentage then it looks at QOS utilization</a:t>
+              <a:t>The target percentage depends on your priority based on your project proposal</a:t>
             </a:r>
           </a:p>
           <a:p>
             <a:r>
               <a:rPr lang="en-US" dirty="0" smtClean="0"/>
-              <a:t>Job priority is adjusted accordingly</a:t>
+              <a:t>Everyone not associated with a project shares a target percentage of 13% (20% of the CU fraction)</a:t>
             </a:r>
           </a:p>
           <a:p>
             <a:pPr lvl="1"/>
-            <a:endParaRPr lang="en-US" dirty="0" smtClean="0"/>
-          </a:p>
-          <a:p>
             <a:r>
               <a:rPr lang="en-US" dirty="0" smtClean="0"/>
-              <a:t>Reminder this all only impacts pending jobs</a:t>
-            </a:r>
+              <a:t>No guaranteed level per user</a:t>
+            </a:r>
+            <a:endParaRPr lang="en-US" dirty="0"/>
           </a:p>
           <a:p>
             <a:r>
               <a:rPr lang="en-US" dirty="0" smtClean="0"/>
-              <a:t>If no other pending jobs and enough resources are available then your job will run regardless of your previous usage</a:t>
-            </a:r>
-          </a:p>
-          <a:p>
-            <a:endParaRPr lang="en-US" dirty="0" smtClean="0"/>
+              <a:t>If you are under your target percentage (based on a 3-4 week average) your priority is increased</a:t>
+            </a:r>
+          </a:p>
+          <a:p>
+            <a:r>
+              <a:rPr lang="en-US" dirty="0" smtClean="0"/>
+              <a:t>If you are over your target percentage (based on a 3-4 week average) your priority is decreased</a:t>
+            </a:r>
           </a:p>
         </p:txBody>
       </p:sp>
@@ -11568,7 +11544,7 @@
           <a:p>
             <a:fld id="{EF0CA858-4E4A-1E41-B7CC-25112B7BAD8B}" type="datetime1">
               <a:rPr lang="en-US" smtClean="0"/>
-              <a:t>1/19/17</a:t>
+              <a:t>3/17/17</a:t>
             </a:fld>
             <a:endParaRPr lang="en-US" dirty="0"/>
           </a:p>
@@ -11624,7 +11600,7 @@
     </p:spTree>
     <p:extLst>
       <p:ext uri="{BB962C8B-B14F-4D97-AF65-F5344CB8AC3E}">
-        <p14:creationId xmlns:p14="http://schemas.microsoft.com/office/powerpoint/2010/main" val="1741713232"/>
+        <p14:creationId xmlns:p14="http://schemas.microsoft.com/office/powerpoint/2010/main" val="1095693951"/>
       </p:ext>
     </p:extLst>
   </p:cSld>
@@ -11668,7 +11644,15 @@
           <a:p>
             <a:r>
               <a:rPr lang="en-US" dirty="0" smtClean="0"/>
-              <a:t>Fair Share Example - Under Utilization</a:t>
+              <a:t>Fair Share Allocation (</a:t>
+            </a:r>
+            <a:r>
+              <a:rPr lang="en-US" dirty="0" err="1" smtClean="0"/>
+              <a:t>Cont</a:t>
+            </a:r>
+            <a:r>
+              <a:rPr lang="en-US" dirty="0" smtClean="0"/>
+              <a:t>)</a:t>
             </a:r>
             <a:endParaRPr lang="en-US" dirty="0"/>
           </a:p>
@@ -11686,67 +11670,40 @@
         </p:nvSpPr>
         <p:spPr/>
         <p:txBody>
-          <a:bodyPr/>
-          <a:lstStyle/>
-          <a:p>
+          <a:bodyPr>
+            <a:normAutofit/>
+          </a:bodyPr>
+          <a:lstStyle/>
+          <a:p>
+            <a:r>
+              <a:rPr lang="en-US" dirty="0" smtClean="0"/>
+              <a:t>Once the system determines the priority based on historical use of the user as well as target percentage then it looks at QOS utilization</a:t>
+            </a:r>
+          </a:p>
+          <a:p>
+            <a:r>
+              <a:rPr lang="en-US" dirty="0" smtClean="0"/>
+              <a:t>Job priority is adjusted accordingly</a:t>
+            </a:r>
+          </a:p>
+          <a:p>
+            <a:pPr lvl="1"/>
             <a:endParaRPr lang="en-US" dirty="0" smtClean="0"/>
           </a:p>
           <a:p>
             <a:r>
               <a:rPr lang="en-US" dirty="0" smtClean="0"/>
-              <a:t>User has not run a job in the last 4 weeks and is trying to run in the </a:t>
-            </a:r>
-            <a:r>
-              <a:rPr lang="en-US" dirty="0" smtClean="0">
-                <a:latin typeface="Courier New" charset="0"/>
-                <a:ea typeface="Courier New" charset="0"/>
-                <a:cs typeface="Courier New" charset="0"/>
-              </a:rPr>
-              <a:t>normal</a:t>
-            </a:r>
+              <a:t>Reminder this all only impacts pending jobs</a:t>
+            </a:r>
+          </a:p>
+          <a:p>
             <a:r>
               <a:rPr lang="en-US" dirty="0" smtClean="0"/>
-              <a:t> QOS</a:t>
-            </a:r>
-          </a:p>
-          <a:p>
-            <a:r>
-              <a:rPr lang="en-US" dirty="0" smtClean="0"/>
-              <a:t>System discovers that the user has a 0% utilization</a:t>
-            </a:r>
-          </a:p>
-          <a:p>
-            <a:pPr lvl="1"/>
-            <a:r>
-              <a:rPr lang="en-US" dirty="0" smtClean="0"/>
-              <a:t>They are therefore under their target percentage, and priority gets bumped up</a:t>
-            </a:r>
-          </a:p>
-          <a:p>
-            <a:r>
-              <a:rPr lang="en-US" dirty="0" smtClean="0"/>
-              <a:t>The system then looks at the </a:t>
-            </a:r>
-            <a:r>
-              <a:rPr lang="en-US" dirty="0" smtClean="0">
-                <a:latin typeface="Courier New" charset="0"/>
-                <a:ea typeface="Courier New" charset="0"/>
-                <a:cs typeface="Courier New" charset="0"/>
-              </a:rPr>
-              <a:t>normal</a:t>
-            </a:r>
-            <a:r>
-              <a:rPr lang="en-US" dirty="0" smtClean="0"/>
-              <a:t> QOS and discovers that it is underutilized</a:t>
-            </a:r>
-          </a:p>
-          <a:p>
-            <a:pPr lvl="1"/>
-            <a:r>
-              <a:rPr lang="en-US" dirty="0" smtClean="0"/>
-              <a:t>Priority gets bumped up</a:t>
-            </a:r>
-            <a:endParaRPr lang="en-US" dirty="0"/>
+              <a:t>If no other pending jobs and enough resources are available then your job will run regardless of your previous usage</a:t>
+            </a:r>
+          </a:p>
+          <a:p>
+            <a:endParaRPr lang="en-US" dirty="0" smtClean="0"/>
           </a:p>
         </p:txBody>
       </p:sp>
@@ -11767,7 +11724,7 @@
           <a:p>
             <a:fld id="{EF0CA858-4E4A-1E41-B7CC-25112B7BAD8B}" type="datetime1">
               <a:rPr lang="en-US" smtClean="0"/>
-              <a:t>1/19/17</a:t>
+              <a:t>3/17/17</a:t>
             </a:fld>
             <a:endParaRPr lang="en-US" dirty="0"/>
           </a:p>
@@ -11823,7 +11780,7 @@
     </p:spTree>
     <p:extLst>
       <p:ext uri="{BB962C8B-B14F-4D97-AF65-F5344CB8AC3E}">
-        <p14:creationId xmlns:p14="http://schemas.microsoft.com/office/powerpoint/2010/main" val="318239184"/>
+        <p14:creationId xmlns:p14="http://schemas.microsoft.com/office/powerpoint/2010/main" val="1741713232"/>
       </p:ext>
     </p:extLst>
   </p:cSld>
@@ -11867,7 +11824,7 @@
           <a:p>
             <a:r>
               <a:rPr lang="en-US" dirty="0" smtClean="0"/>
-              <a:t>Fair Share Example - Over Utilization</a:t>
+              <a:t>Fair Share Example - Under Utilization</a:t>
             </a:r>
             <a:endParaRPr lang="en-US" dirty="0"/>
           </a:p>
@@ -11885,27 +11842,15 @@
         </p:nvSpPr>
         <p:spPr/>
         <p:txBody>
-          <a:bodyPr>
-            <a:normAutofit/>
-          </a:bodyPr>
-          <a:lstStyle/>
+          <a:bodyPr/>
+          <a:lstStyle/>
+          <a:p>
+            <a:endParaRPr lang="en-US" dirty="0" smtClean="0"/>
+          </a:p>
           <a:p>
             <a:r>
               <a:rPr lang="en-US" dirty="0" smtClean="0"/>
-              <a:t>User has been running over their target percentage for the last four weeks</a:t>
-            </a:r>
-          </a:p>
-          <a:p>
-            <a:pPr lvl="1"/>
-            <a:r>
-              <a:rPr lang="en-US" dirty="0" smtClean="0"/>
-              <a:t>Maybe it’s Christmas and the system is idle</a:t>
-            </a:r>
-          </a:p>
-          <a:p>
-            <a:r>
-              <a:rPr lang="en-US" dirty="0" smtClean="0"/>
-              <a:t>Requests to run on the </a:t>
+              <a:t>User has not run a job in the last 4 weeks and is trying to run in the </a:t>
             </a:r>
             <a:r>
               <a:rPr lang="en-US" dirty="0" smtClean="0">
@@ -11923,16 +11868,23 @@
           <a:p>
             <a:r>
               <a:rPr lang="en-US" dirty="0" smtClean="0"/>
-              <a:t>System discovers that the user is over their target percentage, so their priority gets bumped down</a:t>
-            </a:r>
-          </a:p>
-          <a:p>
-            <a:r>
-              <a:rPr lang="en-US" dirty="0"/>
+              <a:t>System discovers that the user has a 0% utilization</a:t>
+            </a:r>
+          </a:p>
+          <a:p>
+            <a:pPr lvl="1"/>
+            <a:r>
+              <a:rPr lang="en-US" dirty="0" smtClean="0"/>
+              <a:t>They are therefore under their target percentage, and priority gets bumped up</a:t>
+            </a:r>
+          </a:p>
+          <a:p>
+            <a:r>
+              <a:rPr lang="en-US" dirty="0" smtClean="0"/>
               <a:t>The system then looks at the </a:t>
             </a:r>
             <a:r>
-              <a:rPr lang="en-US" dirty="0">
+              <a:rPr lang="en-US" dirty="0" smtClean="0">
                 <a:latin typeface="Courier New" charset="0"/>
                 <a:ea typeface="Courier New" charset="0"/>
                 <a:cs typeface="Courier New" charset="0"/>
@@ -11940,22 +11892,16 @@
               <a:t>normal</a:t>
             </a:r>
             <a:r>
-              <a:rPr lang="en-US" dirty="0"/>
-              <a:t> QOS and discovers that it is over utilized</a:t>
+              <a:rPr lang="en-US" dirty="0" smtClean="0"/>
+              <a:t> QOS and discovers that it is underutilized</a:t>
             </a:r>
           </a:p>
           <a:p>
             <a:pPr lvl="1"/>
             <a:r>
-              <a:rPr lang="en-US" dirty="0"/>
-              <a:t>Priority gets bumped further down</a:t>
-            </a:r>
-          </a:p>
-          <a:p>
-            <a:endParaRPr lang="en-US" dirty="0" smtClean="0"/>
-          </a:p>
-          <a:p>
-            <a:pPr lvl="1"/>
+              <a:rPr lang="en-US" dirty="0" smtClean="0"/>
+              <a:t>Priority gets bumped up</a:t>
+            </a:r>
             <a:endParaRPr lang="en-US" dirty="0"/>
           </a:p>
         </p:txBody>
@@ -11977,7 +11923,7 @@
           <a:p>
             <a:fld id="{EF0CA858-4E4A-1E41-B7CC-25112B7BAD8B}" type="datetime1">
               <a:rPr lang="en-US" smtClean="0"/>
-              <a:t>1/19/17</a:t>
+              <a:t>3/17/17</a:t>
             </a:fld>
             <a:endParaRPr lang="en-US" dirty="0"/>
           </a:p>
@@ -12033,7 +11979,7 @@
     </p:spTree>
     <p:extLst>
       <p:ext uri="{BB962C8B-B14F-4D97-AF65-F5344CB8AC3E}">
-        <p14:creationId xmlns:p14="http://schemas.microsoft.com/office/powerpoint/2010/main" val="311811676"/>
+        <p14:creationId xmlns:p14="http://schemas.microsoft.com/office/powerpoint/2010/main" val="318239184"/>
       </p:ext>
     </p:extLst>
   </p:cSld>
@@ -12077,12 +12023,9 @@
           <a:p>
             <a:r>
               <a:rPr lang="en-US" dirty="0" smtClean="0"/>
-              <a:t>Fair Share Example - Over Utilization (Continued</a:t>
-            </a:r>
-            <a:r>
-              <a:rPr lang="en-US" dirty="0"/>
-              <a:t>)</a:t>
-            </a:r>
+              <a:t>Fair Share Example - Over Utilization</a:t>
+            </a:r>
+            <a:endParaRPr lang="en-US" dirty="0"/>
           </a:p>
         </p:txBody>
       </p:sp>
@@ -12103,55 +12046,74 @@
           </a:bodyPr>
           <a:lstStyle/>
           <a:p>
+            <a:r>
+              <a:rPr lang="en-US" dirty="0" smtClean="0"/>
+              <a:t>User has been running over their target percentage for the last four weeks</a:t>
+            </a:r>
+          </a:p>
+          <a:p>
+            <a:pPr lvl="1"/>
+            <a:r>
+              <a:rPr lang="en-US" dirty="0" smtClean="0"/>
+              <a:t>Maybe it’s Christmas and the system is idle</a:t>
+            </a:r>
+          </a:p>
+          <a:p>
+            <a:r>
+              <a:rPr lang="en-US" dirty="0" smtClean="0"/>
+              <a:t>Requests to run on the </a:t>
+            </a:r>
+            <a:r>
+              <a:rPr lang="en-US" dirty="0" smtClean="0">
+                <a:latin typeface="Courier New" charset="0"/>
+                <a:ea typeface="Courier New" charset="0"/>
+                <a:cs typeface="Courier New" charset="0"/>
+              </a:rPr>
+              <a:t>normal</a:t>
+            </a:r>
+            <a:r>
+              <a:rPr lang="en-US" dirty="0" smtClean="0"/>
+              <a:t> QOS</a:t>
+            </a:r>
+          </a:p>
+          <a:p>
+            <a:r>
+              <a:rPr lang="en-US" dirty="0" smtClean="0"/>
+              <a:t>System discovers that the user is over their target percentage, so their priority gets bumped down</a:t>
+            </a:r>
+          </a:p>
+          <a:p>
+            <a:r>
+              <a:rPr lang="en-US" dirty="0"/>
+              <a:t>The system then looks at the </a:t>
+            </a:r>
+            <a:r>
+              <a:rPr lang="en-US" dirty="0">
+                <a:latin typeface="Courier New" charset="0"/>
+                <a:ea typeface="Courier New" charset="0"/>
+                <a:cs typeface="Courier New" charset="0"/>
+              </a:rPr>
+              <a:t>normal</a:t>
+            </a:r>
+            <a:r>
+              <a:rPr lang="en-US" dirty="0"/>
+              <a:t> QOS and discovers that it is over utilized</a:t>
+            </a:r>
+          </a:p>
+          <a:p>
+            <a:pPr lvl="1"/>
+            <a:r>
+              <a:rPr lang="en-US" dirty="0"/>
+              <a:t>Priority gets bumped further down</a:t>
+            </a:r>
+          </a:p>
+          <a:p>
             <a:endParaRPr lang="en-US" dirty="0" smtClean="0"/>
-          </a:p>
-          <a:p>
-            <a:r>
-              <a:rPr lang="en-US" dirty="0" smtClean="0"/>
-              <a:t>Priority is constantly getting re-evaluated based on new information</a:t>
-            </a:r>
-          </a:p>
-          <a:p>
-            <a:pPr lvl="1"/>
-            <a:r>
-              <a:rPr lang="en-US" dirty="0" smtClean="0"/>
-              <a:t>Jobs will get a higher priority the longer they wait</a:t>
-            </a:r>
-          </a:p>
-          <a:p>
-            <a:pPr lvl="1"/>
-            <a:r>
-              <a:rPr lang="en-US" dirty="0"/>
-              <a:t>Can continue to put in jobs but priority is </a:t>
-            </a:r>
-            <a:r>
-              <a:rPr lang="en-US" dirty="0" smtClean="0"/>
-              <a:t>lower</a:t>
-            </a:r>
-          </a:p>
-          <a:p>
-            <a:pPr lvl="1"/>
-            <a:r>
-              <a:rPr lang="en-US" dirty="0"/>
-              <a:t>This will </a:t>
-            </a:r>
-            <a:r>
-              <a:rPr lang="en-US" dirty="0" smtClean="0"/>
-              <a:t>also have </a:t>
-            </a:r>
-            <a:r>
-              <a:rPr lang="en-US" dirty="0"/>
-              <a:t>you be penalized for running jobs in spurts</a:t>
-            </a:r>
           </a:p>
           <a:p>
             <a:pPr lvl="1"/>
             <a:endParaRPr lang="en-US" dirty="0"/>
           </a:p>
-          <a:p>
-            <a:pPr lvl="1"/>
-            <a:endParaRPr lang="en-US" dirty="0"/>
-          </a:p>
         </p:txBody>
       </p:sp>
       <p:sp>
@@ -12171,7 +12133,7 @@
           <a:p>
             <a:fld id="{EF0CA858-4E4A-1E41-B7CC-25112B7BAD8B}" type="datetime1">
               <a:rPr lang="en-US" smtClean="0"/>
-              <a:t>1/19/17</a:t>
+              <a:t>3/17/17</a:t>
             </a:fld>
             <a:endParaRPr lang="en-US" dirty="0"/>
           </a:p>
@@ -12227,7 +12189,7 @@
     </p:spTree>
     <p:extLst>
       <p:ext uri="{BB962C8B-B14F-4D97-AF65-F5344CB8AC3E}">
-        <p14:creationId xmlns:p14="http://schemas.microsoft.com/office/powerpoint/2010/main" val="1885616155"/>
+        <p14:creationId xmlns:p14="http://schemas.microsoft.com/office/powerpoint/2010/main" val="311811676"/>
       </p:ext>
     </p:extLst>
   </p:cSld>
@@ -12271,49 +12233,79 @@
           <a:p>
             <a:r>
               <a:rPr lang="en-US" dirty="0" smtClean="0"/>
-              <a:t>Wall Times</a:t>
-            </a:r>
+              <a:t>Fair Share Example - Over Utilization (Continued</a:t>
+            </a:r>
+            <a:r>
+              <a:rPr lang="en-US" dirty="0"/>
+              <a:t>)</a:t>
+            </a:r>
+          </a:p>
+        </p:txBody>
+      </p:sp>
+      <p:sp>
+        <p:nvSpPr>
+          <p:cNvPr id="3" name="Content Placeholder 2"/>
+          <p:cNvSpPr>
+            <a:spLocks noGrp="1"/>
+          </p:cNvSpPr>
+          <p:nvPr>
+            <p:ph idx="1"/>
+          </p:nvPr>
+        </p:nvSpPr>
+        <p:spPr/>
+        <p:txBody>
+          <a:bodyPr>
+            <a:normAutofit/>
+          </a:bodyPr>
+          <a:lstStyle/>
+          <a:p>
+            <a:endParaRPr lang="en-US" dirty="0" smtClean="0"/>
+          </a:p>
+          <a:p>
+            <a:r>
+              <a:rPr lang="en-US" dirty="0" smtClean="0"/>
+              <a:t>Priority is constantly getting re-evaluated based on new information</a:t>
+            </a:r>
+          </a:p>
+          <a:p>
+            <a:pPr lvl="1"/>
+            <a:r>
+              <a:rPr lang="en-US" dirty="0" smtClean="0"/>
+              <a:t>Jobs will get a higher priority the longer they wait</a:t>
+            </a:r>
+          </a:p>
+          <a:p>
+            <a:pPr lvl="1"/>
+            <a:r>
+              <a:rPr lang="en-US" dirty="0"/>
+              <a:t>Can continue to put in jobs but priority is </a:t>
+            </a:r>
+            <a:r>
+              <a:rPr lang="en-US" dirty="0" smtClean="0"/>
+              <a:t>lower</a:t>
+            </a:r>
+          </a:p>
+          <a:p>
+            <a:pPr lvl="1"/>
+            <a:r>
+              <a:rPr lang="en-US" dirty="0"/>
+              <a:t>This will </a:t>
+            </a:r>
+            <a:r>
+              <a:rPr lang="en-US" dirty="0" smtClean="0"/>
+              <a:t>also have </a:t>
+            </a:r>
+            <a:r>
+              <a:rPr lang="en-US" dirty="0"/>
+              <a:t>you be penalized for running jobs in spurts</a:t>
+            </a:r>
+          </a:p>
+          <a:p>
+            <a:pPr lvl="1"/>
             <a:endParaRPr lang="en-US" dirty="0"/>
           </a:p>
-        </p:txBody>
-      </p:sp>
-      <p:sp>
-        <p:nvSpPr>
-          <p:cNvPr id="3" name="Content Placeholder 2"/>
-          <p:cNvSpPr>
-            <a:spLocks noGrp="1"/>
-          </p:cNvSpPr>
-          <p:nvPr>
-            <p:ph idx="1"/>
-          </p:nvPr>
-        </p:nvSpPr>
-        <p:spPr/>
-        <p:txBody>
-          <a:bodyPr/>
-          <a:lstStyle/>
-          <a:p>
-            <a:r>
-              <a:rPr lang="en-US" dirty="0" smtClean="0"/>
-              <a:t>The maximum amount of time your job will be allowed to run</a:t>
-            </a:r>
-          </a:p>
-          <a:p>
-            <a:r>
-              <a:rPr lang="en-US" dirty="0" smtClean="0"/>
-              <a:t>How do I know how much time that will be?</a:t>
-            </a:r>
-          </a:p>
-          <a:p>
-            <a:r>
-              <a:rPr lang="en-US" dirty="0" smtClean="0"/>
-              <a:t>What happens if I select too much time?</a:t>
-            </a:r>
-          </a:p>
-          <a:p>
-            <a:r>
-              <a:rPr lang="en-US" dirty="0" smtClean="0"/>
-              <a:t>What happens if I select too little time?</a:t>
-            </a:r>
+          <a:p>
+            <a:pPr lvl="1"/>
             <a:endParaRPr lang="en-US" dirty="0"/>
           </a:p>
         </p:txBody>
@@ -12333,9 +12325,9 @@
           <a:bodyPr/>
           <a:lstStyle/>
           <a:p>
-            <a:fld id="{458ABAA4-74E3-0245-9FDE-7BD19B71E311}" type="datetime1">
-              <a:rPr lang="en-US" smtClean="0"/>
-              <a:t>1/19/17</a:t>
+            <a:fld id="{EF0CA858-4E4A-1E41-B7CC-25112B7BAD8B}" type="datetime1">
+              <a:rPr lang="en-US" smtClean="0"/>
+              <a:t>3/17/17</a:t>
             </a:fld>
             <a:endParaRPr lang="en-US" dirty="0"/>
           </a:p>
@@ -12391,7 +12383,7 @@
     </p:spTree>
     <p:extLst>
       <p:ext uri="{BB962C8B-B14F-4D97-AF65-F5344CB8AC3E}">
-        <p14:creationId xmlns:p14="http://schemas.microsoft.com/office/powerpoint/2010/main" val="1138947286"/>
+        <p14:creationId xmlns:p14="http://schemas.microsoft.com/office/powerpoint/2010/main" val="1885616155"/>
       </p:ext>
     </p:extLst>
   </p:cSld>
@@ -12526,7 +12518,7 @@
           <a:p>
             <a:fld id="{4287E083-B003-0E46-8B67-AC3170880693}" type="datetime1">
               <a:rPr lang="en-US" smtClean="0"/>
-              <a:t>1/19/17</a:t>
+              <a:t>3/17/17</a:t>
             </a:fld>
             <a:endParaRPr lang="en-US"/>
           </a:p>
@@ -12636,8 +12628,8 @@
           <a:lstStyle/>
           <a:p>
             <a:r>
-              <a:rPr lang="en-US" smtClean="0"/>
-              <a:t>Software</a:t>
+              <a:rPr lang="en-US" dirty="0" smtClean="0"/>
+              <a:t>Wall Times</a:t>
             </a:r>
             <a:endParaRPr lang="en-US" dirty="0"/>
           </a:p>
@@ -12653,58 +12645,40 @@
             <p:ph idx="1"/>
           </p:nvPr>
         </p:nvSpPr>
-        <p:spPr>
-          <a:xfrm>
-            <a:off x="457199" y="1764471"/>
-            <a:ext cx="8191533" cy="4211326"/>
-          </a:xfrm>
-        </p:spPr>
-        <p:txBody>
-          <a:bodyPr>
-            <a:normAutofit/>
-          </a:bodyPr>
-          <a:lstStyle/>
-          <a:p>
-            <a:r>
-              <a:rPr lang="en-US" sz="2600" dirty="0" smtClean="0"/>
-              <a:t>Common software is available to everyone on the systems</a:t>
-            </a:r>
-          </a:p>
-          <a:p>
-            <a:r>
-              <a:rPr lang="en-US" sz="2600" dirty="0"/>
-              <a:t>Can install your own </a:t>
-            </a:r>
-            <a:r>
-              <a:rPr lang="en-US" sz="2600" dirty="0" smtClean="0"/>
-              <a:t>software</a:t>
-            </a:r>
-          </a:p>
-          <a:p>
-            <a:r>
-              <a:rPr lang="en-US" sz="2600" dirty="0" smtClean="0"/>
-              <a:t>To find out what software is available, you can type </a:t>
-            </a:r>
-            <a:r>
-              <a:rPr lang="en-US" sz="2600" b="1" dirty="0" smtClean="0"/>
-              <a:t>ml avail</a:t>
-            </a:r>
-          </a:p>
-          <a:p>
-            <a:r>
-              <a:rPr lang="en-US" sz="2600" dirty="0" smtClean="0"/>
-              <a:t>To set up your environment to use a software package, type </a:t>
-            </a:r>
-            <a:r>
-              <a:rPr lang="en-US" sz="2600" b="1" dirty="0" smtClean="0"/>
-              <a:t>ml &lt;package&gt;/&lt;version&gt;</a:t>
-            </a:r>
-          </a:p>
-        </p:txBody>
-      </p:sp>
-      <p:sp>
-        <p:nvSpPr>
-          <p:cNvPr id="5" name="Date Placeholder 4"/>
+        <p:spPr/>
+        <p:txBody>
+          <a:bodyPr/>
+          <a:lstStyle/>
+          <a:p>
+            <a:r>
+              <a:rPr lang="en-US" dirty="0" smtClean="0"/>
+              <a:t>The maximum amount of time your job will be allowed to run</a:t>
+            </a:r>
+          </a:p>
+          <a:p>
+            <a:r>
+              <a:rPr lang="en-US" dirty="0" smtClean="0"/>
+              <a:t>How do I know how much time that will be?</a:t>
+            </a:r>
+          </a:p>
+          <a:p>
+            <a:r>
+              <a:rPr lang="en-US" dirty="0" smtClean="0"/>
+              <a:t>What happens if I select too much time?</a:t>
+            </a:r>
+          </a:p>
+          <a:p>
+            <a:r>
+              <a:rPr lang="en-US" dirty="0" smtClean="0"/>
+              <a:t>What happens if I select too little time?</a:t>
+            </a:r>
+            <a:endParaRPr lang="en-US" dirty="0"/>
+          </a:p>
+        </p:txBody>
+      </p:sp>
+      <p:sp>
+        <p:nvSpPr>
+          <p:cNvPr id="4" name="Date Placeholder 3"/>
           <p:cNvSpPr>
             <a:spLocks noGrp="1"/>
           </p:cNvSpPr>
@@ -12717,17 +12691,17 @@
           <a:bodyPr/>
           <a:lstStyle/>
           <a:p>
-            <a:fld id="{73C15B28-B30E-D048-ABCB-A2BFD4CA1212}" type="datetime1">
-              <a:rPr lang="en-US" smtClean="0"/>
-              <a:t>1/19/17</a:t>
+            <a:fld id="{458ABAA4-74E3-0245-9FDE-7BD19B71E311}" type="datetime1">
+              <a:rPr lang="en-US" smtClean="0"/>
+              <a:t>3/17/17</a:t>
             </a:fld>
-            <a:endParaRPr lang="en-US"/>
-          </a:p>
-        </p:txBody>
-      </p:sp>
-      <p:sp>
-        <p:nvSpPr>
-          <p:cNvPr id="6" name="Footer Placeholder 5"/>
+            <a:endParaRPr lang="en-US" dirty="0"/>
+          </a:p>
+        </p:txBody>
+      </p:sp>
+      <p:sp>
+        <p:nvSpPr>
+          <p:cNvPr id="5" name="Footer Placeholder 4"/>
           <p:cNvSpPr>
             <a:spLocks noGrp="1"/>
           </p:cNvSpPr>
@@ -12744,13 +12718,13 @@
               <a:rPr lang="en-US" smtClean="0"/>
               <a:t>Basics of Supercomputing</a:t>
             </a:r>
-            <a:endParaRPr lang="en-US"/>
-          </a:p>
-        </p:txBody>
-      </p:sp>
-      <p:sp>
-        <p:nvSpPr>
-          <p:cNvPr id="21" name="Slide Number Placeholder 20"/>
+            <a:endParaRPr lang="en-US" dirty="0"/>
+          </a:p>
+        </p:txBody>
+      </p:sp>
+      <p:sp>
+        <p:nvSpPr>
+          <p:cNvPr id="6" name="Slide Number Placeholder 5"/>
           <p:cNvSpPr>
             <a:spLocks noGrp="1"/>
           </p:cNvSpPr>
@@ -12775,20 +12749,13 @@
     </p:spTree>
     <p:extLst>
       <p:ext uri="{BB962C8B-B14F-4D97-AF65-F5344CB8AC3E}">
-        <p14:creationId xmlns:p14="http://schemas.microsoft.com/office/powerpoint/2010/main" val="129869412"/>
+        <p14:creationId xmlns:p14="http://schemas.microsoft.com/office/powerpoint/2010/main" val="1138947286"/>
       </p:ext>
     </p:extLst>
   </p:cSld>
   <p:clrMapOvr>
     <a:masterClrMapping/>
   </p:clrMapOvr>
-  <p:timing>
-    <p:tnLst>
-      <p:par>
-        <p:cTn id="1" dur="indefinite" restart="never" nodeType="tmRoot"/>
-      </p:par>
-    </p:tnLst>
-  </p:timing>
 </p:sld>
 </file>
 
@@ -12856,83 +12823,37 @@
           <a:p>
             <a:r>
               <a:rPr lang="en-US" sz="2600" dirty="0" smtClean="0"/>
-              <a:t>Things to be aware of</a:t>
-            </a:r>
-          </a:p>
-          <a:p>
-            <a:pPr lvl="1"/>
-            <a:r>
-              <a:rPr lang="en-US" dirty="0" smtClean="0"/>
-              <a:t>Some software packages require you to first load a </a:t>
-            </a:r>
-            <a:r>
-              <a:rPr lang="en-US" smtClean="0"/>
-              <a:t>compiler module</a:t>
-            </a:r>
-            <a:endParaRPr lang="en-US" dirty="0" smtClean="0"/>
-          </a:p>
-          <a:p>
-            <a:pPr lvl="2"/>
-            <a:r>
-              <a:rPr lang="en-US" dirty="0" smtClean="0"/>
-              <a:t>Intel, </a:t>
-            </a:r>
-            <a:r>
-              <a:rPr lang="en-US" dirty="0" err="1" smtClean="0"/>
-              <a:t>gcc</a:t>
-            </a:r>
-            <a:endParaRPr lang="en-US" dirty="0" smtClean="0"/>
-          </a:p>
-          <a:p>
-            <a:pPr lvl="2"/>
-            <a:r>
-              <a:rPr lang="en-US" dirty="0" smtClean="0"/>
-              <a:t>Will fail to load the module</a:t>
-            </a:r>
-          </a:p>
-          <a:p>
-            <a:pPr lvl="1"/>
-            <a:r>
-              <a:rPr lang="en-US" dirty="0" smtClean="0"/>
-              <a:t>Some packages require you to be specify a version – for example R</a:t>
-            </a:r>
-          </a:p>
-          <a:p>
-            <a:pPr lvl="2"/>
-            <a:r>
-              <a:rPr lang="en-US" dirty="0">
-                <a:latin typeface="Courier New" charset="0"/>
-                <a:ea typeface="Courier New" charset="0"/>
-                <a:cs typeface="Courier New" charset="0"/>
-              </a:rPr>
-              <a:t>m</a:t>
-            </a:r>
-            <a:r>
-              <a:rPr lang="en-US" dirty="0" smtClean="0">
-                <a:latin typeface="Courier New" charset="0"/>
-                <a:ea typeface="Courier New" charset="0"/>
-                <a:cs typeface="Courier New" charset="0"/>
-              </a:rPr>
-              <a:t>l R/3.2.0</a:t>
-            </a:r>
-          </a:p>
-          <a:p>
-            <a:pPr lvl="2"/>
-            <a:r>
-              <a:rPr lang="en-US" dirty="0" smtClean="0"/>
-              <a:t>Use </a:t>
-            </a:r>
-            <a:r>
-              <a:rPr lang="en-US" dirty="0" smtClean="0">
-                <a:latin typeface="Courier New" charset="0"/>
-                <a:ea typeface="Courier New" charset="0"/>
-                <a:cs typeface="Courier New" charset="0"/>
-              </a:rPr>
-              <a:t>module spider </a:t>
-            </a:r>
-            <a:r>
-              <a:rPr lang="en-US" dirty="0" smtClean="0"/>
-              <a:t>to find more information</a:t>
+              <a:t>Common software is available to everyone on the systems</a:t>
+            </a:r>
+          </a:p>
+          <a:p>
+            <a:r>
+              <a:rPr lang="en-US" sz="2600" dirty="0"/>
+              <a:t>Can install your own </a:t>
+            </a:r>
+            <a:r>
+              <a:rPr lang="en-US" sz="2600" dirty="0" smtClean="0"/>
+              <a:t>software</a:t>
+            </a:r>
+          </a:p>
+          <a:p>
+            <a:r>
+              <a:rPr lang="en-US" sz="2600" dirty="0" smtClean="0"/>
+              <a:t>To find out what software is available, you can type </a:t>
+            </a:r>
+            <a:r>
+              <a:rPr lang="en-US" sz="2600" b="1" dirty="0" smtClean="0"/>
+              <a:t>ml avail</a:t>
+            </a:r>
+          </a:p>
+          <a:p>
+            <a:r>
+              <a:rPr lang="en-US" sz="2600" dirty="0" smtClean="0"/>
+              <a:t>To set up your environment to use a software package, type </a:t>
+            </a:r>
+            <a:r>
+              <a:rPr lang="en-US" sz="2600" b="1" dirty="0" smtClean="0"/>
+              <a:t>ml &lt;package&gt;/&lt;version&gt;</a:t>
             </a:r>
           </a:p>
         </p:txBody>
@@ -12954,7 +12875,7 @@
           <a:p>
             <a:fld id="{73C15B28-B30E-D048-ABCB-A2BFD4CA1212}" type="datetime1">
               <a:rPr lang="en-US" smtClean="0"/>
-              <a:t>1/19/17</a:t>
+              <a:t>3/17/17</a:t>
             </a:fld>
             <a:endParaRPr lang="en-US"/>
           </a:p>
@@ -13010,7 +12931,7 @@
     </p:spTree>
     <p:extLst>
       <p:ext uri="{BB962C8B-B14F-4D97-AF65-F5344CB8AC3E}">
-        <p14:creationId xmlns:p14="http://schemas.microsoft.com/office/powerpoint/2010/main" val="1417232169"/>
+        <p14:creationId xmlns:p14="http://schemas.microsoft.com/office/powerpoint/2010/main" val="129869412"/>
       </p:ext>
     </p:extLst>
   </p:cSld>
@@ -13060,100 +12981,115 @@
           <a:lstStyle/>
           <a:p>
             <a:r>
+              <a:rPr lang="en-US" smtClean="0"/>
+              <a:t>Software</a:t>
+            </a:r>
+            <a:endParaRPr lang="en-US" dirty="0"/>
+          </a:p>
+        </p:txBody>
+      </p:sp>
+      <p:sp>
+        <p:nvSpPr>
+          <p:cNvPr id="3" name="Content Placeholder 2"/>
+          <p:cNvSpPr>
+            <a:spLocks noGrp="1"/>
+          </p:cNvSpPr>
+          <p:nvPr>
+            <p:ph idx="1"/>
+          </p:nvPr>
+        </p:nvSpPr>
+        <p:spPr>
+          <a:xfrm>
+            <a:off x="457199" y="1764471"/>
+            <a:ext cx="8191533" cy="4211326"/>
+          </a:xfrm>
+        </p:spPr>
+        <p:txBody>
+          <a:bodyPr>
+            <a:normAutofit/>
+          </a:bodyPr>
+          <a:lstStyle/>
+          <a:p>
+            <a:r>
+              <a:rPr lang="en-US" sz="2600" dirty="0" smtClean="0"/>
+              <a:t>Things to be aware of</a:t>
+            </a:r>
+          </a:p>
+          <a:p>
+            <a:pPr lvl="1"/>
+            <a:r>
               <a:rPr lang="en-US" dirty="0" smtClean="0"/>
-              <a:t>Initial Steps to Use RC Systems</a:t>
-            </a:r>
-            <a:endParaRPr lang="en-US" dirty="0"/>
-          </a:p>
-        </p:txBody>
-      </p:sp>
-      <p:sp>
-        <p:nvSpPr>
-          <p:cNvPr id="3" name="Content Placeholder 2"/>
-          <p:cNvSpPr>
-            <a:spLocks noGrp="1"/>
-          </p:cNvSpPr>
-          <p:nvPr>
-            <p:ph idx="1"/>
-          </p:nvPr>
-        </p:nvSpPr>
-        <p:spPr/>
-        <p:txBody>
-          <a:bodyPr>
-            <a:noAutofit/>
-          </a:bodyPr>
-          <a:lstStyle/>
-          <a:p>
-            <a:r>
-              <a:rPr lang="en-US" sz="2600" dirty="0" smtClean="0"/>
-              <a:t>Apply for an RC account</a:t>
+              <a:t>Some software packages require you to first load a </a:t>
+            </a:r>
+            <a:r>
+              <a:rPr lang="en-US" smtClean="0"/>
+              <a:t>compiler module</a:t>
+            </a:r>
+            <a:endParaRPr lang="en-US" dirty="0" smtClean="0"/>
+          </a:p>
+          <a:p>
+            <a:pPr lvl="2"/>
+            <a:r>
+              <a:rPr lang="en-US" dirty="0" smtClean="0"/>
+              <a:t>Intel, </a:t>
+            </a:r>
+            <a:r>
+              <a:rPr lang="en-US" dirty="0" err="1" smtClean="0"/>
+              <a:t>gcc</a:t>
+            </a:r>
+            <a:endParaRPr lang="en-US" dirty="0" smtClean="0"/>
+          </a:p>
+          <a:p>
+            <a:pPr lvl="2"/>
+            <a:r>
+              <a:rPr lang="en-US" dirty="0" smtClean="0"/>
+              <a:t>Will fail to load the module</a:t>
             </a:r>
           </a:p>
           <a:p>
             <a:pPr lvl="1"/>
             <a:r>
-              <a:rPr lang="en-US" sz="2600" dirty="0">
-                <a:hlinkClick r:id="rId3"/>
+              <a:rPr lang="en-US" dirty="0" smtClean="0"/>
+              <a:t>Some packages require you to be specify a version – for example R</a:t>
+            </a:r>
+          </a:p>
+          <a:p>
+            <a:pPr lvl="2"/>
+            <a:r>
+              <a:rPr lang="en-US" dirty="0">
+                <a:latin typeface="Courier New" charset="0"/>
+                <a:ea typeface="Courier New" charset="0"/>
+                <a:cs typeface="Courier New" charset="0"/>
               </a:rPr>
-              <a:t>https:/</a:t>
-            </a:r>
-            <a:r>
-              <a:rPr lang="en-US" sz="2600" dirty="0" smtClean="0">
-                <a:hlinkClick r:id="rId3"/>
+              <a:t>m</a:t>
+            </a:r>
+            <a:r>
+              <a:rPr lang="en-US" dirty="0" smtClean="0">
+                <a:latin typeface="Courier New" charset="0"/>
+                <a:ea typeface="Courier New" charset="0"/>
+                <a:cs typeface="Courier New" charset="0"/>
               </a:rPr>
-              <a:t>/portals.rc.colorado.edu/account/request</a:t>
-            </a:r>
-            <a:endParaRPr lang="en-US" sz="2600" dirty="0" smtClean="0"/>
-          </a:p>
-          <a:p>
-            <a:pPr marL="411480" lvl="1" indent="0">
-              <a:buNone/>
-            </a:pPr>
-            <a:endParaRPr lang="en-US" sz="1200" dirty="0" smtClean="0"/>
-          </a:p>
-          <a:p>
-            <a:r>
-              <a:rPr lang="en-US" sz="2600" dirty="0" smtClean="0"/>
-              <a:t>Get registered with Duo</a:t>
-            </a:r>
-          </a:p>
-          <a:p>
-            <a:pPr lvl="1"/>
+              <a:t>l R/3.2.0</a:t>
+            </a:r>
+          </a:p>
+          <a:p>
+            <a:pPr lvl="2"/>
             <a:r>
               <a:rPr lang="en-US" dirty="0" smtClean="0"/>
-              <a:t>Duo invitation</a:t>
-            </a:r>
-          </a:p>
-          <a:p>
-            <a:pPr lvl="1"/>
+              <a:t>Use </a:t>
+            </a:r>
+            <a:r>
+              <a:rPr lang="en-US" dirty="0" smtClean="0">
+                <a:latin typeface="Courier New" charset="0"/>
+                <a:ea typeface="Courier New" charset="0"/>
+                <a:cs typeface="Courier New" charset="0"/>
+              </a:rPr>
+              <a:t>module spider </a:t>
+            </a:r>
             <a:r>
               <a:rPr lang="en-US" dirty="0" smtClean="0"/>
-              <a:t>Smart phone app</a:t>
-            </a:r>
-          </a:p>
-          <a:p>
-            <a:pPr lvl="1"/>
-            <a:r>
-              <a:rPr lang="en-US" dirty="0" smtClean="0"/>
-              <a:t>Push notifications</a:t>
-            </a:r>
-          </a:p>
-          <a:p>
-            <a:pPr marL="114300" indent="0">
-              <a:buNone/>
-            </a:pPr>
-            <a:endParaRPr lang="en-US" sz="1200" dirty="0" smtClean="0"/>
-          </a:p>
-          <a:p>
-            <a:r>
-              <a:rPr lang="en-US" sz="2600" dirty="0" smtClean="0"/>
-              <a:t>Apply for a </a:t>
-            </a:r>
-            <a:r>
-              <a:rPr lang="en-US" sz="2600" smtClean="0"/>
-              <a:t>computing allocation</a:t>
-            </a:r>
-            <a:endParaRPr lang="en-US" sz="2600" dirty="0" smtClean="0"/>
+              <a:t>to find more information</a:t>
+            </a:r>
           </a:p>
         </p:txBody>
       </p:sp>
@@ -13172,9 +13108,9 @@
           <a:bodyPr/>
           <a:lstStyle/>
           <a:p>
-            <a:fld id="{F60D83B5-3204-294A-A8AE-42C29FD994E9}" type="datetime1">
-              <a:rPr lang="en-US" smtClean="0"/>
-              <a:t>1/19/17</a:t>
+            <a:fld id="{73C15B28-B30E-D048-ABCB-A2BFD4CA1212}" type="datetime1">
+              <a:rPr lang="en-US" smtClean="0"/>
+              <a:t>3/17/17</a:t>
             </a:fld>
             <a:endParaRPr lang="en-US"/>
           </a:p>
@@ -13205,7 +13141,7 @@
       </p:sp>
       <p:sp>
         <p:nvSpPr>
-          <p:cNvPr id="4" name="Slide Number Placeholder 3"/>
+          <p:cNvPr id="21" name="Slide Number Placeholder 20"/>
           <p:cNvSpPr>
             <a:spLocks noGrp="1"/>
           </p:cNvSpPr>
@@ -13213,33 +13149,24 @@
             <p:ph type="sldNum" sz="quarter" idx="4"/>
           </p:nvPr>
         </p:nvSpPr>
-        <p:spPr>
-          <a:xfrm>
-            <a:off x="7619999" y="6477423"/>
-            <a:ext cx="433231" cy="312889"/>
-          </a:xfrm>
-          <a:prstGeom prst="bracketPair">
-            <a:avLst>
-              <a:gd name="adj" fmla="val 17949"/>
-            </a:avLst>
-          </a:prstGeom>
-        </p:spPr>
-        <p:txBody>
-          <a:bodyPr/>
-          <a:lstStyle/>
-          <a:p>
-            <a:fld id="{718654E8-5BC9-7544-A602-FE2C9BCA3333}" type="slidenum">
-              <a:rPr lang="en-US" smtClean="0"/>
+        <p:spPr/>
+        <p:txBody>
+          <a:bodyPr/>
+          <a:lstStyle/>
+          <a:p>
+            <a:fld id="{249E94F7-107C-CE46-8C56-9CACFF99CD93}" type="slidenum">
+              <a:rPr lang="en-US" smtClean="0"/>
+              <a:pPr/>
               <a:t>32</a:t>
             </a:fld>
-            <a:endParaRPr lang="en-US"/>
+            <a:endParaRPr lang="en-US" dirty="0"/>
           </a:p>
         </p:txBody>
       </p:sp>
     </p:spTree>
     <p:extLst>
       <p:ext uri="{BB962C8B-B14F-4D97-AF65-F5344CB8AC3E}">
-        <p14:creationId xmlns:p14="http://schemas.microsoft.com/office/powerpoint/2010/main" val="1038094808"/>
+        <p14:creationId xmlns:p14="http://schemas.microsoft.com/office/powerpoint/2010/main" val="1417232169"/>
       </p:ext>
     </p:extLst>
   </p:cSld>
@@ -13290,7 +13217,7 @@
           <a:p>
             <a:r>
               <a:rPr lang="en-US" dirty="0" smtClean="0"/>
-              <a:t>Janus/Summit Access</a:t>
+              <a:t>Initial Steps to Use RC Systems</a:t>
             </a:r>
             <a:endParaRPr lang="en-US" dirty="0"/>
           </a:p>
@@ -13306,133 +13233,129 @@
             <p:ph idx="1"/>
           </p:nvPr>
         </p:nvSpPr>
-        <p:spPr>
-          <a:xfrm>
-            <a:off x="195943" y="1600200"/>
-            <a:ext cx="8778240" cy="4688490"/>
-          </a:xfrm>
-        </p:spPr>
-        <p:txBody>
-          <a:bodyPr/>
-          <a:lstStyle/>
-          <a:p>
+        <p:spPr/>
+        <p:txBody>
+          <a:bodyPr>
+            <a:noAutofit/>
+          </a:bodyPr>
+          <a:lstStyle/>
+          <a:p>
+            <a:r>
+              <a:rPr lang="en-US" sz="2600" dirty="0" smtClean="0"/>
+              <a:t>Apply for an RC account</a:t>
+            </a:r>
+          </a:p>
+          <a:p>
+            <a:pPr lvl="1"/>
+            <a:r>
+              <a:rPr lang="en-US" sz="2600" dirty="0">
+                <a:hlinkClick r:id="rId3"/>
+              </a:rPr>
+              <a:t>https:/</a:t>
+            </a:r>
+            <a:r>
+              <a:rPr lang="en-US" sz="2600" dirty="0" smtClean="0">
+                <a:hlinkClick r:id="rId3"/>
+              </a:rPr>
+              <a:t>/portals.rc.colorado.edu/account/request</a:t>
+            </a:r>
+            <a:endParaRPr lang="en-US" sz="2600" dirty="0" smtClean="0"/>
+          </a:p>
+          <a:p>
+            <a:pPr marL="411480" lvl="1" indent="0">
+              <a:buNone/>
+            </a:pPr>
+            <a:endParaRPr lang="en-US" sz="1200" dirty="0" smtClean="0"/>
+          </a:p>
+          <a:p>
+            <a:r>
+              <a:rPr lang="en-US" sz="2600" dirty="0" smtClean="0"/>
+              <a:t>Get registered with Duo</a:t>
+            </a:r>
+          </a:p>
+          <a:p>
+            <a:pPr lvl="1"/>
             <a:r>
               <a:rPr lang="en-US" dirty="0" smtClean="0"/>
-              <a:t>To </a:t>
-            </a:r>
-            <a:r>
-              <a:rPr lang="en-US" dirty="0"/>
-              <a:t>access RC’s computing, in general:</a:t>
-            </a:r>
-          </a:p>
-          <a:p>
-            <a:endParaRPr lang="en-US" dirty="0"/>
+              <a:t>Duo invitation</a:t>
+            </a:r>
+          </a:p>
+          <a:p>
+            <a:pPr lvl="1"/>
+            <a:r>
+              <a:rPr lang="en-US" dirty="0" smtClean="0"/>
+              <a:t>Smart phone app</a:t>
+            </a:r>
+          </a:p>
+          <a:p>
+            <a:pPr lvl="1"/>
+            <a:r>
+              <a:rPr lang="en-US" dirty="0" smtClean="0"/>
+              <a:t>Push notifications</a:t>
+            </a:r>
           </a:p>
           <a:p>
             <a:pPr marL="114300" indent="0">
               <a:buNone/>
             </a:pPr>
-            <a:r>
-              <a:rPr lang="en-US" dirty="0" err="1">
-                <a:latin typeface="Courier" charset="0"/>
-                <a:ea typeface="Courier" charset="0"/>
-                <a:cs typeface="Courier" charset="0"/>
-              </a:rPr>
-              <a:t>ssh</a:t>
-            </a:r>
-            <a:r>
-              <a:rPr lang="en-US" dirty="0">
-                <a:latin typeface="Courier" charset="0"/>
-                <a:ea typeface="Courier" charset="0"/>
-                <a:cs typeface="Courier" charset="0"/>
-              </a:rPr>
-              <a:t> </a:t>
-            </a:r>
-            <a:r>
-              <a:rPr lang="en-US" dirty="0" err="1">
-                <a:latin typeface="Courier" charset="0"/>
-                <a:ea typeface="Courier" charset="0"/>
-                <a:cs typeface="Courier" charset="0"/>
-              </a:rPr>
-              <a:t>login.rc.colorado.edu</a:t>
-            </a:r>
-            <a:r>
-              <a:rPr lang="en-US" dirty="0">
-                <a:latin typeface="Courier" charset="0"/>
-                <a:ea typeface="Courier" charset="0"/>
-                <a:cs typeface="Courier" charset="0"/>
-              </a:rPr>
-              <a:t> –l &lt;username&gt;</a:t>
-            </a:r>
-          </a:p>
-          <a:p>
-            <a:pPr marL="114300" indent="0">
-              <a:buNone/>
-            </a:pPr>
-            <a:r>
-              <a:rPr lang="en-US" dirty="0">
-                <a:latin typeface="Courier" charset="0"/>
-                <a:ea typeface="Courier" charset="0"/>
-                <a:cs typeface="Courier" charset="0"/>
-              </a:rPr>
-              <a:t>Password:  duo:&lt;</a:t>
-            </a:r>
-            <a:r>
-              <a:rPr lang="en-US" dirty="0" err="1">
-                <a:latin typeface="Courier" charset="0"/>
-                <a:ea typeface="Courier" charset="0"/>
-                <a:cs typeface="Courier" charset="0"/>
-              </a:rPr>
-              <a:t>identikey</a:t>
-            </a:r>
-            <a:r>
-              <a:rPr lang="en-US" dirty="0">
-                <a:latin typeface="Courier" charset="0"/>
-                <a:ea typeface="Courier" charset="0"/>
-                <a:cs typeface="Courier" charset="0"/>
-              </a:rPr>
-              <a:t>&gt;</a:t>
-            </a:r>
-          </a:p>
-          <a:p>
-            <a:pPr marL="114300" indent="0">
-              <a:buNone/>
-            </a:pPr>
-            <a:endParaRPr lang="en-US" dirty="0">
-              <a:latin typeface="Courier" charset="0"/>
-              <a:ea typeface="Courier" charset="0"/>
-              <a:cs typeface="Courier" charset="0"/>
-            </a:endParaRPr>
-          </a:p>
-          <a:p>
-            <a:r>
-              <a:rPr lang="en-US" dirty="0">
-                <a:latin typeface="Helvetica Neue" charset="0"/>
-                <a:ea typeface="Helvetica Neue" charset="0"/>
-                <a:cs typeface="Helvetica Neue" charset="0"/>
-              </a:rPr>
-              <a:t>Need the Duo application</a:t>
-            </a:r>
-          </a:p>
-          <a:p>
-            <a:pPr marL="114300" indent="0">
-              <a:buNone/>
-            </a:pPr>
-            <a:endParaRPr lang="en-US" dirty="0" smtClean="0">
-              <a:latin typeface="Courier" charset="0"/>
-              <a:ea typeface="Courier" charset="0"/>
-              <a:cs typeface="Courier" charset="0"/>
-            </a:endParaRPr>
-          </a:p>
-          <a:p>
-            <a:pPr marL="114300" indent="0">
-              <a:buNone/>
-            </a:pPr>
-            <a:endParaRPr lang="en-US" dirty="0" smtClean="0">
-              <a:latin typeface="Courier" charset="0"/>
-              <a:ea typeface="Courier" charset="0"/>
-              <a:cs typeface="Courier" charset="0"/>
-            </a:endParaRPr>
+            <a:endParaRPr lang="en-US" sz="1200" dirty="0" smtClean="0"/>
+          </a:p>
+          <a:p>
+            <a:r>
+              <a:rPr lang="en-US" sz="2600" dirty="0" smtClean="0"/>
+              <a:t>Apply for a </a:t>
+            </a:r>
+            <a:r>
+              <a:rPr lang="en-US" sz="2600" smtClean="0"/>
+              <a:t>computing allocation</a:t>
+            </a:r>
+            <a:endParaRPr lang="en-US" sz="2600" dirty="0" smtClean="0"/>
+          </a:p>
+        </p:txBody>
+      </p:sp>
+      <p:sp>
+        <p:nvSpPr>
+          <p:cNvPr id="5" name="Date Placeholder 4"/>
+          <p:cNvSpPr>
+            <a:spLocks noGrp="1"/>
+          </p:cNvSpPr>
+          <p:nvPr>
+            <p:ph type="dt" sz="half" idx="10"/>
+          </p:nvPr>
+        </p:nvSpPr>
+        <p:spPr/>
+        <p:txBody>
+          <a:bodyPr/>
+          <a:lstStyle/>
+          <a:p>
+            <a:fld id="{F60D83B5-3204-294A-A8AE-42C29FD994E9}" type="datetime1">
+              <a:rPr lang="en-US" smtClean="0"/>
+              <a:t>3/17/17</a:t>
+            </a:fld>
+            <a:endParaRPr lang="en-US"/>
+          </a:p>
+        </p:txBody>
+      </p:sp>
+      <p:sp>
+        <p:nvSpPr>
+          <p:cNvPr id="6" name="Footer Placeholder 5"/>
+          <p:cNvSpPr>
+            <a:spLocks noGrp="1"/>
+          </p:cNvSpPr>
+          <p:nvPr>
+            <p:ph type="ftr" sz="quarter" idx="11"/>
+          </p:nvPr>
+        </p:nvSpPr>
+        <p:spPr/>
+        <p:txBody>
+          <a:bodyPr/>
+          <a:lstStyle/>
+          <a:p>
+            <a:r>
+              <a:rPr lang="en-US" smtClean="0"/>
+              <a:t>Basics of Supercomputing</a:t>
+            </a:r>
+            <a:endParaRPr lang="en-US"/>
           </a:p>
         </p:txBody>
       </p:sp>
@@ -13446,76 +13369,46 @@
             <p:ph type="sldNum" sz="quarter" idx="4"/>
           </p:nvPr>
         </p:nvSpPr>
-        <p:spPr/>
-        <p:txBody>
-          <a:bodyPr/>
-          <a:lstStyle/>
-          <a:p>
-            <a:fld id="{249E94F7-107C-CE46-8C56-9CACFF99CD93}" type="slidenum">
-              <a:rPr lang="en-US" smtClean="0"/>
-              <a:pPr/>
+        <p:spPr>
+          <a:xfrm>
+            <a:off x="7619999" y="6477423"/>
+            <a:ext cx="433231" cy="312889"/>
+          </a:xfrm>
+          <a:prstGeom prst="bracketPair">
+            <a:avLst>
+              <a:gd name="adj" fmla="val 17949"/>
+            </a:avLst>
+          </a:prstGeom>
+        </p:spPr>
+        <p:txBody>
+          <a:bodyPr/>
+          <a:lstStyle/>
+          <a:p>
+            <a:fld id="{718654E8-5BC9-7544-A602-FE2C9BCA3333}" type="slidenum">
+              <a:rPr lang="en-US" smtClean="0"/>
               <a:t>33</a:t>
             </a:fld>
-            <a:endParaRPr lang="en-US" dirty="0"/>
-          </a:p>
-        </p:txBody>
-      </p:sp>
-      <p:sp>
-        <p:nvSpPr>
-          <p:cNvPr id="5" name="Date Placeholder 4"/>
-          <p:cNvSpPr>
-            <a:spLocks noGrp="1"/>
-          </p:cNvSpPr>
-          <p:nvPr>
-            <p:ph type="dt" sz="half" idx="10"/>
-          </p:nvPr>
-        </p:nvSpPr>
-        <p:spPr/>
-        <p:txBody>
-          <a:bodyPr/>
-          <a:lstStyle/>
-          <a:p>
-            <a:fld id="{85578CC7-E869-3644-9623-1911B01EF1A3}" type="datetime1">
-              <a:rPr lang="en-US" smtClean="0"/>
-              <a:t>1/19/17</a:t>
-            </a:fld>
-            <a:endParaRPr lang="en-US" dirty="0"/>
-          </a:p>
-        </p:txBody>
-      </p:sp>
-      <p:sp>
-        <p:nvSpPr>
-          <p:cNvPr id="6" name="Footer Placeholder 5"/>
-          <p:cNvSpPr>
-            <a:spLocks noGrp="1"/>
-          </p:cNvSpPr>
-          <p:nvPr>
-            <p:ph type="ftr" sz="quarter" idx="11"/>
-          </p:nvPr>
-        </p:nvSpPr>
-        <p:spPr/>
-        <p:txBody>
-          <a:bodyPr/>
-          <a:lstStyle/>
-          <a:p>
-            <a:r>
-              <a:rPr lang="en-US" smtClean="0"/>
-              <a:t>Basics of Supercomputing</a:t>
-            </a:r>
-            <a:endParaRPr lang="en-US" dirty="0"/>
+            <a:endParaRPr lang="en-US"/>
           </a:p>
         </p:txBody>
       </p:sp>
     </p:spTree>
     <p:extLst>
       <p:ext uri="{BB962C8B-B14F-4D97-AF65-F5344CB8AC3E}">
-        <p14:creationId xmlns:p14="http://schemas.microsoft.com/office/powerpoint/2010/main" val="123680792"/>
+        <p14:creationId xmlns:p14="http://schemas.microsoft.com/office/powerpoint/2010/main" val="1038094808"/>
       </p:ext>
     </p:extLst>
   </p:cSld>
   <p:clrMapOvr>
     <a:masterClrMapping/>
   </p:clrMapOvr>
+  <p:timing>
+    <p:tnLst>
+      <p:par>
+        <p:cTn id="1" dur="indefinite" restart="never" nodeType="tmRoot"/>
+      </p:par>
+    </p:tnLst>
+  </p:timing>
 </p:sld>
 </file>
 
@@ -13553,6 +13446,269 @@
           <a:p>
             <a:r>
               <a:rPr lang="en-US" dirty="0" smtClean="0"/>
+              <a:t>Janus/Summit Access</a:t>
+            </a:r>
+            <a:endParaRPr lang="en-US" dirty="0"/>
+          </a:p>
+        </p:txBody>
+      </p:sp>
+      <p:sp>
+        <p:nvSpPr>
+          <p:cNvPr id="3" name="Content Placeholder 2"/>
+          <p:cNvSpPr>
+            <a:spLocks noGrp="1"/>
+          </p:cNvSpPr>
+          <p:nvPr>
+            <p:ph idx="1"/>
+          </p:nvPr>
+        </p:nvSpPr>
+        <p:spPr>
+          <a:xfrm>
+            <a:off x="195943" y="1600200"/>
+            <a:ext cx="8778240" cy="4688490"/>
+          </a:xfrm>
+        </p:spPr>
+        <p:txBody>
+          <a:bodyPr/>
+          <a:lstStyle/>
+          <a:p>
+            <a:r>
+              <a:rPr lang="en-US" dirty="0" smtClean="0"/>
+              <a:t>To </a:t>
+            </a:r>
+            <a:r>
+              <a:rPr lang="en-US" dirty="0"/>
+              <a:t>access RC’s computing, in general:</a:t>
+            </a:r>
+          </a:p>
+          <a:p>
+            <a:endParaRPr lang="en-US" dirty="0"/>
+          </a:p>
+          <a:p>
+            <a:pPr marL="114300" indent="0">
+              <a:buNone/>
+            </a:pPr>
+            <a:r>
+              <a:rPr lang="en-US" dirty="0" err="1">
+                <a:latin typeface="Courier" charset="0"/>
+                <a:ea typeface="Courier" charset="0"/>
+                <a:cs typeface="Courier" charset="0"/>
+              </a:rPr>
+              <a:t>ssh</a:t>
+            </a:r>
+            <a:r>
+              <a:rPr lang="en-US" dirty="0">
+                <a:latin typeface="Courier" charset="0"/>
+                <a:ea typeface="Courier" charset="0"/>
+                <a:cs typeface="Courier" charset="0"/>
+              </a:rPr>
+              <a:t> </a:t>
+            </a:r>
+            <a:r>
+              <a:rPr lang="en-US" dirty="0" err="1">
+                <a:latin typeface="Courier" charset="0"/>
+                <a:ea typeface="Courier" charset="0"/>
+                <a:cs typeface="Courier" charset="0"/>
+              </a:rPr>
+              <a:t>login.rc.colorado.edu</a:t>
+            </a:r>
+            <a:r>
+              <a:rPr lang="en-US" dirty="0">
+                <a:latin typeface="Courier" charset="0"/>
+                <a:ea typeface="Courier" charset="0"/>
+                <a:cs typeface="Courier" charset="0"/>
+              </a:rPr>
+              <a:t> –l &lt;username&gt;</a:t>
+            </a:r>
+          </a:p>
+          <a:p>
+            <a:pPr marL="114300" indent="0">
+              <a:buNone/>
+            </a:pPr>
+            <a:r>
+              <a:rPr lang="en-US" dirty="0">
+                <a:latin typeface="Courier" charset="0"/>
+                <a:ea typeface="Courier" charset="0"/>
+                <a:cs typeface="Courier" charset="0"/>
+              </a:rPr>
+              <a:t>Password:  duo:&lt;</a:t>
+            </a:r>
+            <a:r>
+              <a:rPr lang="en-US" dirty="0" err="1">
+                <a:latin typeface="Courier" charset="0"/>
+                <a:ea typeface="Courier" charset="0"/>
+                <a:cs typeface="Courier" charset="0"/>
+              </a:rPr>
+              <a:t>identikey</a:t>
+            </a:r>
+            <a:r>
+              <a:rPr lang="en-US" dirty="0">
+                <a:latin typeface="Courier" charset="0"/>
+                <a:ea typeface="Courier" charset="0"/>
+                <a:cs typeface="Courier" charset="0"/>
+              </a:rPr>
+              <a:t>&gt;</a:t>
+            </a:r>
+          </a:p>
+          <a:p>
+            <a:pPr marL="114300" indent="0">
+              <a:buNone/>
+            </a:pPr>
+            <a:endParaRPr lang="en-US" dirty="0">
+              <a:latin typeface="Courier" charset="0"/>
+              <a:ea typeface="Courier" charset="0"/>
+              <a:cs typeface="Courier" charset="0"/>
+            </a:endParaRPr>
+          </a:p>
+          <a:p>
+            <a:r>
+              <a:rPr lang="en-US" dirty="0">
+                <a:latin typeface="Helvetica Neue" charset="0"/>
+                <a:ea typeface="Helvetica Neue" charset="0"/>
+                <a:cs typeface="Helvetica Neue" charset="0"/>
+              </a:rPr>
+              <a:t>Need the Duo application</a:t>
+            </a:r>
+          </a:p>
+          <a:p>
+            <a:pPr marL="114300" indent="0">
+              <a:buNone/>
+            </a:pPr>
+            <a:endParaRPr lang="en-US" dirty="0" smtClean="0">
+              <a:latin typeface="Courier" charset="0"/>
+              <a:ea typeface="Courier" charset="0"/>
+              <a:cs typeface="Courier" charset="0"/>
+            </a:endParaRPr>
+          </a:p>
+          <a:p>
+            <a:pPr marL="114300" indent="0">
+              <a:buNone/>
+            </a:pPr>
+            <a:endParaRPr lang="en-US" dirty="0" smtClean="0">
+              <a:latin typeface="Courier" charset="0"/>
+              <a:ea typeface="Courier" charset="0"/>
+              <a:cs typeface="Courier" charset="0"/>
+            </a:endParaRPr>
+          </a:p>
+        </p:txBody>
+      </p:sp>
+      <p:sp>
+        <p:nvSpPr>
+          <p:cNvPr id="4" name="Slide Number Placeholder 3"/>
+          <p:cNvSpPr>
+            <a:spLocks noGrp="1"/>
+          </p:cNvSpPr>
+          <p:nvPr>
+            <p:ph type="sldNum" sz="quarter" idx="4"/>
+          </p:nvPr>
+        </p:nvSpPr>
+        <p:spPr/>
+        <p:txBody>
+          <a:bodyPr/>
+          <a:lstStyle/>
+          <a:p>
+            <a:fld id="{249E94F7-107C-CE46-8C56-9CACFF99CD93}" type="slidenum">
+              <a:rPr lang="en-US" smtClean="0"/>
+              <a:pPr/>
+              <a:t>34</a:t>
+            </a:fld>
+            <a:endParaRPr lang="en-US" dirty="0"/>
+          </a:p>
+        </p:txBody>
+      </p:sp>
+      <p:sp>
+        <p:nvSpPr>
+          <p:cNvPr id="5" name="Date Placeholder 4"/>
+          <p:cNvSpPr>
+            <a:spLocks noGrp="1"/>
+          </p:cNvSpPr>
+          <p:nvPr>
+            <p:ph type="dt" sz="half" idx="10"/>
+          </p:nvPr>
+        </p:nvSpPr>
+        <p:spPr/>
+        <p:txBody>
+          <a:bodyPr/>
+          <a:lstStyle/>
+          <a:p>
+            <a:fld id="{85578CC7-E869-3644-9623-1911B01EF1A3}" type="datetime1">
+              <a:rPr lang="en-US" smtClean="0"/>
+              <a:t>3/17/17</a:t>
+            </a:fld>
+            <a:endParaRPr lang="en-US" dirty="0"/>
+          </a:p>
+        </p:txBody>
+      </p:sp>
+      <p:sp>
+        <p:nvSpPr>
+          <p:cNvPr id="6" name="Footer Placeholder 5"/>
+          <p:cNvSpPr>
+            <a:spLocks noGrp="1"/>
+          </p:cNvSpPr>
+          <p:nvPr>
+            <p:ph type="ftr" sz="quarter" idx="11"/>
+          </p:nvPr>
+        </p:nvSpPr>
+        <p:spPr/>
+        <p:txBody>
+          <a:bodyPr/>
+          <a:lstStyle/>
+          <a:p>
+            <a:r>
+              <a:rPr lang="en-US" smtClean="0"/>
+              <a:t>Basics of Supercomputing</a:t>
+            </a:r>
+            <a:endParaRPr lang="en-US" dirty="0"/>
+          </a:p>
+        </p:txBody>
+      </p:sp>
+    </p:spTree>
+    <p:extLst>
+      <p:ext uri="{BB962C8B-B14F-4D97-AF65-F5344CB8AC3E}">
+        <p14:creationId xmlns:p14="http://schemas.microsoft.com/office/powerpoint/2010/main" val="123680792"/>
+      </p:ext>
+    </p:extLst>
+  </p:cSld>
+  <p:clrMapOvr>
+    <a:masterClrMapping/>
+  </p:clrMapOvr>
+</p:sld>
+</file>
+
+<file path=ppt/slides/slide35.xml><?xml version="1.0" encoding="utf-8"?>
+<p:sld xmlns:a="http://schemas.openxmlformats.org/drawingml/2006/main" xmlns:r="http://schemas.openxmlformats.org/officeDocument/2006/relationships" xmlns:p="http://schemas.openxmlformats.org/presentationml/2006/main">
+  <p:cSld>
+    <p:spTree>
+      <p:nvGrpSpPr>
+        <p:cNvPr id="1" name=""/>
+        <p:cNvGrpSpPr/>
+        <p:nvPr/>
+      </p:nvGrpSpPr>
+      <p:grpSpPr>
+        <a:xfrm>
+          <a:off x="0" y="0"/>
+          <a:ext cx="0" cy="0"/>
+          <a:chOff x="0" y="0"/>
+          <a:chExt cx="0" cy="0"/>
+        </a:xfrm>
+      </p:grpSpPr>
+      <p:sp>
+        <p:nvSpPr>
+          <p:cNvPr id="2" name="Title 1"/>
+          <p:cNvSpPr>
+            <a:spLocks noGrp="1"/>
+          </p:cNvSpPr>
+          <p:nvPr>
+            <p:ph type="title"/>
+          </p:nvPr>
+        </p:nvSpPr>
+        <p:spPr/>
+        <p:txBody>
+          <a:bodyPr/>
+          <a:lstStyle/>
+          <a:p>
+            <a:r>
+              <a:rPr lang="en-US" dirty="0" smtClean="0"/>
               <a:t>Questions?</a:t>
             </a:r>
             <a:endParaRPr lang="en-US" dirty="0"/>
@@ -13675,7 +13831,7 @@
           <a:p>
             <a:fld id="{7E1CAACC-F82F-BF4F-B0F1-61A165586382}" type="datetime1">
               <a:rPr lang="en-US" smtClean="0"/>
-              <a:t>1/19/17</a:t>
+              <a:t>3/17/17</a:t>
             </a:fld>
             <a:endParaRPr lang="en-US" dirty="0"/>
           </a:p>
@@ -13722,7 +13878,7 @@
             <a:fld id="{249E94F7-107C-CE46-8C56-9CACFF99CD93}" type="slidenum">
               <a:rPr lang="en-US" smtClean="0"/>
               <a:pPr/>
-              <a:t>34</a:t>
+              <a:t>35</a:t>
             </a:fld>
             <a:endParaRPr lang="en-US" dirty="0"/>
           </a:p>
@@ -13840,7 +13996,7 @@
           <a:p>
             <a:fld id="{B5971A08-B04B-5740-9258-B1389A0D7433}" type="datetime1">
               <a:rPr lang="en-US" smtClean="0"/>
-              <a:t>1/19/17</a:t>
+              <a:t>3/17/17</a:t>
             </a:fld>
             <a:endParaRPr lang="en-US" dirty="0"/>
           </a:p>
@@ -14065,7 +14221,7 @@
           <a:p>
             <a:fld id="{C0E3C796-AEC8-A24E-8F0A-1EFD4AE0C1C5}" type="datetime1">
               <a:rPr lang="en-US" smtClean="0"/>
-              <a:t>1/19/17</a:t>
+              <a:t>3/17/17</a:t>
             </a:fld>
             <a:endParaRPr lang="en-US" dirty="0"/>
           </a:p>
@@ -14295,7 +14451,7 @@
           <a:p>
             <a:fld id="{A2272723-B6C7-3940-A6F1-F61BA4408DAC}" type="datetime1">
               <a:rPr lang="en-US" smtClean="0"/>
-              <a:t>1/19/17</a:t>
+              <a:t>3/17/17</a:t>
             </a:fld>
             <a:endParaRPr lang="en-US" dirty="0"/>
           </a:p>
@@ -15197,7 +15353,7 @@
           <a:p>
             <a:fld id="{E3FC9C8A-EB37-424E-A756-0DB6D78A1B63}" type="datetime1">
               <a:rPr lang="en-US" smtClean="0"/>
-              <a:t>1/19/17</a:t>
+              <a:t>3/17/17</a:t>
             </a:fld>
             <a:endParaRPr lang="en-US" dirty="0"/>
           </a:p>
@@ -15426,7 +15582,7 @@
           <a:p>
             <a:fld id="{F32FB309-DF92-8A4E-A812-C4903C3D8A8F}" type="datetime1">
               <a:rPr lang="en-US" smtClean="0"/>
-              <a:t>1/19/17</a:t>
+              <a:t>3/17/17</a:t>
             </a:fld>
             <a:endParaRPr lang="en-US" dirty="0"/>
           </a:p>
@@ -15562,7 +15718,7 @@
           <a:p>
             <a:fld id="{EF0CA858-4E4A-1E41-B7CC-25112B7BAD8B}" type="datetime1">
               <a:rPr lang="en-US" smtClean="0"/>
-              <a:t>1/19/17</a:t>
+              <a:t>3/17/17</a:t>
             </a:fld>
             <a:endParaRPr lang="en-US" dirty="0"/>
           </a:p>

</xml_diff>